<commit_message>
Add document before go home
</commit_message>
<xml_diff>
--- a/POS REPORT.pptx
+++ b/POS REPORT.pptx
@@ -12,28 +12,10 @@
     <p:sldId id="268" r:id="rId6"/>
     <p:sldId id="259" r:id="rId7"/>
     <p:sldId id="260" r:id="rId8"/>
-    <p:sldId id="261" r:id="rId9"/>
-    <p:sldId id="270" r:id="rId10"/>
-    <p:sldId id="271" r:id="rId11"/>
-    <p:sldId id="272" r:id="rId12"/>
-    <p:sldId id="273" r:id="rId13"/>
-    <p:sldId id="274" r:id="rId14"/>
-    <p:sldId id="275" r:id="rId15"/>
-    <p:sldId id="276" r:id="rId16"/>
-    <p:sldId id="277" r:id="rId17"/>
-    <p:sldId id="278" r:id="rId18"/>
-    <p:sldId id="279" r:id="rId19"/>
-    <p:sldId id="280" r:id="rId20"/>
-    <p:sldId id="281" r:id="rId21"/>
-    <p:sldId id="282" r:id="rId22"/>
-    <p:sldId id="283" r:id="rId23"/>
-    <p:sldId id="284" r:id="rId24"/>
-    <p:sldId id="262" r:id="rId25"/>
-    <p:sldId id="263" r:id="rId26"/>
-    <p:sldId id="264" r:id="rId27"/>
-    <p:sldId id="265" r:id="rId28"/>
-    <p:sldId id="266" r:id="rId29"/>
-    <p:sldId id="267" r:id="rId30"/>
+    <p:sldId id="286" r:id="rId9"/>
+    <p:sldId id="285" r:id="rId10"/>
+    <p:sldId id="261" r:id="rId11"/>
+    <p:sldId id="267" r:id="rId12"/>
   </p:sldIdLst>
   <p:sldSz cx="12192000" cy="6858000"/>
   <p:notesSz cx="6858000" cy="9144000"/>
@@ -132,6 +114,11 @@
       </a:defRPr>
     </a:lvl9pPr>
   </p:defaultTextStyle>
+  <p:extLst>
+    <p:ext uri="{EFAFB233-063F-42B5-8137-9DF3F51BA10A}">
+      <p15:sldGuideLst xmlns:p15="http://schemas.microsoft.com/office/powerpoint/2012/main"/>
+    </p:ext>
+  </p:extLst>
 </p:presentation>
 </file>
 
@@ -11200,8 +11187,8 @@
         </p:nvGrpSpPr>
         <p:grpSpPr>
           <a:xfrm>
-            <a:off x="946331" y="151708"/>
-            <a:ext cx="7765143" cy="911430"/>
+            <a:off x="946332" y="151708"/>
+            <a:ext cx="5258526" cy="911430"/>
             <a:chOff x="0" y="2405429"/>
             <a:chExt cx="7765143" cy="911430"/>
           </a:xfrm>
@@ -11329,10 +11316,10 @@
       </p:grpSp>
       <p:sp>
         <p:nvSpPr>
-          <p:cNvPr id="10" name="Rectangle 9">
+          <p:cNvPr id="7" name="Rectangle 6">
             <a:extLst>
               <a:ext uri="{FF2B5EF4-FFF2-40B4-BE49-F238E27FC236}">
-                <a16:creationId xmlns:a16="http://schemas.microsoft.com/office/drawing/2014/main" id="{DA13A663-A660-4142-A601-35F4AB3CB6CB}"/>
+                <a16:creationId xmlns:a16="http://schemas.microsoft.com/office/drawing/2014/main" id="{7AAE6DAD-873F-4A7A-8D39-920FCA61C70D}"/>
               </a:ext>
             </a:extLst>
           </p:cNvPr>
@@ -11373,57 +11360,84 @@
           </a:p>
         </p:txBody>
       </p:sp>
-      <p:pic>
-        <p:nvPicPr>
-          <p:cNvPr id="5122" name="Picture 2">
+      <p:sp>
+        <p:nvSpPr>
+          <p:cNvPr id="8" name="Rectangle 7">
             <a:extLst>
               <a:ext uri="{FF2B5EF4-FFF2-40B4-BE49-F238E27FC236}">
-                <a16:creationId xmlns:a16="http://schemas.microsoft.com/office/drawing/2014/main" id="{1B175A4B-64C7-4A24-B416-F4FBBFB315DA}"/>
+                <a16:creationId xmlns:a16="http://schemas.microsoft.com/office/drawing/2014/main" id="{BD8B5AAD-BF7A-44F2-ABA1-1CA1ECEE9DB4}"/>
               </a:ext>
             </a:extLst>
           </p:cNvPr>
-          <p:cNvPicPr>
-            <a:picLocks noChangeAspect="1" noChangeArrowheads="1"/>
-          </p:cNvPicPr>
+          <p:cNvSpPr/>
           <p:nvPr/>
-        </p:nvPicPr>
-        <p:blipFill>
-          <a:blip r:embed="rId2">
-            <a:extLst>
-              <a:ext uri="{28A0092B-C50C-407E-A947-70E740481C1C}">
-                <a14:useLocalDpi xmlns:a14="http://schemas.microsoft.com/office/drawing/2010/main" val="0"/>
-              </a:ext>
-            </a:extLst>
-          </a:blip>
-          <a:srcRect/>
-          <a:stretch>
-            <a:fillRect/>
-          </a:stretch>
-        </p:blipFill>
-        <p:spPr bwMode="auto">
+        </p:nvSpPr>
+        <p:spPr>
           <a:xfrm>
-            <a:off x="946331" y="1883602"/>
-            <a:ext cx="10842172" cy="2671014"/>
+            <a:off x="1924593" y="1827313"/>
+            <a:ext cx="9714411" cy="954107"/>
           </a:xfrm>
           <a:prstGeom prst="rect">
             <a:avLst/>
           </a:prstGeom>
-          <a:noFill/>
-          <a:extLst>
-            <a:ext uri="{909E8E84-426E-40DD-AFC4-6F175D3DCCD1}">
-              <a14:hiddenFill xmlns:a14="http://schemas.microsoft.com/office/drawing/2010/main">
-                <a:solidFill>
-                  <a:srgbClr val="FFFFFF"/>
-                </a:solidFill>
-              </a14:hiddenFill>
-            </a:ext>
-          </a:extLst>
         </p:spPr>
-      </p:pic>
+        <p:txBody>
+          <a:bodyPr wrap="square">
+            <a:spAutoFit/>
+          </a:bodyPr>
+          <a:lstStyle/>
+          <a:p>
+            <a:r>
+              <a:rPr lang="en-US" sz="2800" dirty="0">
+                <a:latin typeface="-apple-system"/>
+              </a:rPr>
+              <a:t>Registering your customers will give you the ability to grant them various privileges such as discounts, loyalty program ...</a:t>
+            </a:r>
+            <a:endParaRPr lang="vi-VN" sz="2800" dirty="0"/>
+          </a:p>
+        </p:txBody>
+      </p:sp>
+      <p:sp>
+        <p:nvSpPr>
+          <p:cNvPr id="9" name="Rectangle 8">
+            <a:extLst>
+              <a:ext uri="{FF2B5EF4-FFF2-40B4-BE49-F238E27FC236}">
+                <a16:creationId xmlns:a16="http://schemas.microsoft.com/office/drawing/2014/main" id="{CAFBA94F-FBB8-46A6-8AD6-8CB55E1C6304}"/>
+              </a:ext>
+            </a:extLst>
+          </p:cNvPr>
+          <p:cNvSpPr/>
+          <p:nvPr/>
+        </p:nvSpPr>
+        <p:spPr>
+          <a:xfrm>
+            <a:off x="1924593" y="2982667"/>
+            <a:ext cx="9374777" cy="954107"/>
+          </a:xfrm>
+          <a:prstGeom prst="rect">
+            <a:avLst/>
+          </a:prstGeom>
+        </p:spPr>
+        <p:txBody>
+          <a:bodyPr wrap="square">
+            <a:spAutoFit/>
+          </a:bodyPr>
+          <a:lstStyle/>
+          <a:p>
+            <a:r>
+              <a:rPr lang="en-US" sz="2800" dirty="0">
+                <a:latin typeface="-apple-system"/>
+              </a:rPr>
+              <a:t>It will also be required if they want an invoice and registering them will make any future interaction with them faster.</a:t>
+            </a:r>
+            <a:endParaRPr lang="vi-VN" sz="2800" dirty="0"/>
+          </a:p>
+        </p:txBody>
+      </p:sp>
     </p:spTree>
     <p:extLst>
       <p:ext uri="{BB962C8B-B14F-4D97-AF65-F5344CB8AC3E}">
-        <p14:creationId xmlns:p14="http://schemas.microsoft.com/office/powerpoint/2010/main" val="2419979530"/>
+        <p14:creationId xmlns:p14="http://schemas.microsoft.com/office/powerpoint/2010/main" val="967820989"/>
       </p:ext>
     </p:extLst>
   </p:cSld>
@@ -11434,3333 +11448,6 @@
 </file>
 
 <file path=ppt/slides/slide11.xml><?xml version="1.0" encoding="utf-8"?>
-<p:sld xmlns:a="http://schemas.openxmlformats.org/drawingml/2006/main" xmlns:r="http://schemas.openxmlformats.org/officeDocument/2006/relationships" xmlns:p="http://schemas.openxmlformats.org/presentationml/2006/main">
-  <p:cSld>
-    <p:spTree>
-      <p:nvGrpSpPr>
-        <p:cNvPr id="1" name=""/>
-        <p:cNvGrpSpPr/>
-        <p:nvPr/>
-      </p:nvGrpSpPr>
-      <p:grpSpPr>
-        <a:xfrm>
-          <a:off x="0" y="0"/>
-          <a:ext cx="0" cy="0"/>
-          <a:chOff x="0" y="0"/>
-          <a:chExt cx="0" cy="0"/>
-        </a:xfrm>
-      </p:grpSpPr>
-      <p:grpSp>
-        <p:nvGrpSpPr>
-          <p:cNvPr id="4" name="Group 3">
-            <a:extLst>
-              <a:ext uri="{FF2B5EF4-FFF2-40B4-BE49-F238E27FC236}">
-                <a16:creationId xmlns:a16="http://schemas.microsoft.com/office/drawing/2014/main" id="{D944BAA1-C6F8-40D8-9555-818F8267CF7F}"/>
-              </a:ext>
-            </a:extLst>
-          </p:cNvPr>
-          <p:cNvGrpSpPr/>
-          <p:nvPr/>
-        </p:nvGrpSpPr>
-        <p:grpSpPr>
-          <a:xfrm>
-            <a:off x="946331" y="151708"/>
-            <a:ext cx="7765143" cy="911430"/>
-            <a:chOff x="0" y="2405429"/>
-            <a:chExt cx="7765143" cy="911430"/>
-          </a:xfrm>
-        </p:grpSpPr>
-        <p:sp>
-          <p:nvSpPr>
-            <p:cNvPr id="5" name="Rectangle: Rounded Corners 4">
-              <a:extLst>
-                <a:ext uri="{FF2B5EF4-FFF2-40B4-BE49-F238E27FC236}">
-                  <a16:creationId xmlns:a16="http://schemas.microsoft.com/office/drawing/2014/main" id="{61EEB3F5-CF75-42ED-9C45-79AB7C3777BB}"/>
-                </a:ext>
-              </a:extLst>
-            </p:cNvPr>
-            <p:cNvSpPr/>
-            <p:nvPr/>
-          </p:nvSpPr>
-          <p:spPr>
-            <a:xfrm>
-              <a:off x="0" y="2405429"/>
-              <a:ext cx="7765143" cy="911430"/>
-            </a:xfrm>
-            <a:prstGeom prst="roundRect">
-              <a:avLst/>
-            </a:prstGeom>
-          </p:spPr>
-          <p:style>
-            <a:lnRef idx="0">
-              <a:schemeClr val="lt1">
-                <a:hueOff val="0"/>
-                <a:satOff val="0"/>
-                <a:lumOff val="0"/>
-                <a:alphaOff val="0"/>
-              </a:schemeClr>
-            </a:lnRef>
-            <a:fillRef idx="3">
-              <a:schemeClr val="accent4">
-                <a:hueOff val="0"/>
-                <a:satOff val="0"/>
-                <a:lumOff val="0"/>
-                <a:alphaOff val="0"/>
-              </a:schemeClr>
-            </a:fillRef>
-            <a:effectRef idx="2">
-              <a:schemeClr val="accent4">
-                <a:hueOff val="0"/>
-                <a:satOff val="0"/>
-                <a:lumOff val="0"/>
-                <a:alphaOff val="0"/>
-              </a:schemeClr>
-            </a:effectRef>
-            <a:fontRef idx="minor">
-              <a:schemeClr val="lt1"/>
-            </a:fontRef>
-          </p:style>
-        </p:sp>
-        <p:sp>
-          <p:nvSpPr>
-            <p:cNvPr id="6" name="Rectangle: Rounded Corners 4">
-              <a:extLst>
-                <a:ext uri="{FF2B5EF4-FFF2-40B4-BE49-F238E27FC236}">
-                  <a16:creationId xmlns:a16="http://schemas.microsoft.com/office/drawing/2014/main" id="{A6AE1549-2AE4-40DE-AF1C-EF8CD8CD4C27}"/>
-                </a:ext>
-              </a:extLst>
-            </p:cNvPr>
-            <p:cNvSpPr txBox="1"/>
-            <p:nvPr/>
-          </p:nvSpPr>
-          <p:spPr>
-            <a:xfrm>
-              <a:off x="44492" y="2449921"/>
-              <a:ext cx="7676159" cy="822446"/>
-            </a:xfrm>
-            <a:prstGeom prst="rect">
-              <a:avLst/>
-            </a:prstGeom>
-          </p:spPr>
-          <p:style>
-            <a:lnRef idx="0">
-              <a:scrgbClr r="0" g="0" b="0"/>
-            </a:lnRef>
-            <a:fillRef idx="0">
-              <a:scrgbClr r="0" g="0" b="0"/>
-            </a:fillRef>
-            <a:effectRef idx="0">
-              <a:scrgbClr r="0" g="0" b="0"/>
-            </a:effectRef>
-            <a:fontRef idx="minor">
-              <a:schemeClr val="lt1"/>
-            </a:fontRef>
-          </p:style>
-          <p:txBody>
-            <a:bodyPr spcFirstLastPara="0" vert="horz" wrap="square" lIns="144780" tIns="144780" rIns="144780" bIns="144780" numCol="1" spcCol="1270" anchor="ctr" anchorCtr="0">
-              <a:noAutofit/>
-            </a:bodyPr>
-            <a:lstStyle/>
-            <a:p>
-              <a:pPr marL="0" lvl="0" indent="0" algn="l" defTabSz="1689100">
-                <a:lnSpc>
-                  <a:spcPct val="90000"/>
-                </a:lnSpc>
-                <a:spcBef>
-                  <a:spcPct val="0"/>
-                </a:spcBef>
-                <a:spcAft>
-                  <a:spcPct val="35000"/>
-                </a:spcAft>
-                <a:buNone/>
-              </a:pPr>
-              <a:r>
-                <a:rPr lang="en-US" sz="3800" b="1" kern="1200" dirty="0">
-                  <a:latin typeface="Tahoma" panose="020B0604030504040204" pitchFamily="34" charset="0"/>
-                  <a:ea typeface="Tahoma" panose="020B0604030504040204" pitchFamily="34" charset="0"/>
-                  <a:cs typeface="Tahoma" panose="020B0604030504040204" pitchFamily="34" charset="0"/>
-                </a:rPr>
-                <a:t>Demo Point of Sale</a:t>
-              </a:r>
-              <a:endParaRPr lang="vi-VN" sz="3800" b="1" kern="1200" dirty="0">
-                <a:latin typeface="Tahoma" panose="020B0604030504040204" pitchFamily="34" charset="0"/>
-                <a:ea typeface="Tahoma" panose="020B0604030504040204" pitchFamily="34" charset="0"/>
-                <a:cs typeface="Tahoma" panose="020B0604030504040204" pitchFamily="34" charset="0"/>
-              </a:endParaRPr>
-            </a:p>
-          </p:txBody>
-        </p:sp>
-      </p:grpSp>
-      <p:sp>
-        <p:nvSpPr>
-          <p:cNvPr id="10" name="Rectangle 9">
-            <a:extLst>
-              <a:ext uri="{FF2B5EF4-FFF2-40B4-BE49-F238E27FC236}">
-                <a16:creationId xmlns:a16="http://schemas.microsoft.com/office/drawing/2014/main" id="{DA13A663-A660-4142-A601-35F4AB3CB6CB}"/>
-              </a:ext>
-            </a:extLst>
-          </p:cNvPr>
-          <p:cNvSpPr/>
-          <p:nvPr/>
-        </p:nvSpPr>
-        <p:spPr>
-          <a:xfrm>
-            <a:off x="1535456" y="1119427"/>
-            <a:ext cx="4450193" cy="707886"/>
-          </a:xfrm>
-          <a:prstGeom prst="rect">
-            <a:avLst/>
-          </a:prstGeom>
-        </p:spPr>
-        <p:txBody>
-          <a:bodyPr wrap="none">
-            <a:spAutoFit/>
-          </a:bodyPr>
-          <a:lstStyle/>
-          <a:p>
-            <a:r>
-              <a:rPr lang="vi-VN" sz="4000" b="1" dirty="0">
-                <a:solidFill>
-                  <a:srgbClr val="21313A"/>
-                </a:solidFill>
-                <a:latin typeface="Work Sans"/>
-              </a:rPr>
-              <a:t>2. Activate invoicing</a:t>
-            </a:r>
-            <a:endParaRPr lang="vi-VN" sz="4000" b="1" i="0" dirty="0">
-              <a:solidFill>
-                <a:srgbClr val="21313A"/>
-              </a:solidFill>
-              <a:effectLst/>
-              <a:latin typeface="Work Sans"/>
-            </a:endParaRPr>
-          </a:p>
-        </p:txBody>
-      </p:sp>
-    </p:spTree>
-    <p:extLst>
-      <p:ext uri="{BB962C8B-B14F-4D97-AF65-F5344CB8AC3E}">
-        <p14:creationId xmlns:p14="http://schemas.microsoft.com/office/powerpoint/2010/main" val="2166304157"/>
-      </p:ext>
-    </p:extLst>
-  </p:cSld>
-  <p:clrMapOvr>
-    <a:masterClrMapping/>
-  </p:clrMapOvr>
-</p:sld>
-</file>
-
-<file path=ppt/slides/slide12.xml><?xml version="1.0" encoding="utf-8"?>
-<p:sld xmlns:a="http://schemas.openxmlformats.org/drawingml/2006/main" xmlns:r="http://schemas.openxmlformats.org/officeDocument/2006/relationships" xmlns:p="http://schemas.openxmlformats.org/presentationml/2006/main">
-  <p:cSld>
-    <p:spTree>
-      <p:nvGrpSpPr>
-        <p:cNvPr id="1" name=""/>
-        <p:cNvGrpSpPr/>
-        <p:nvPr/>
-      </p:nvGrpSpPr>
-      <p:grpSpPr>
-        <a:xfrm>
-          <a:off x="0" y="0"/>
-          <a:ext cx="0" cy="0"/>
-          <a:chOff x="0" y="0"/>
-          <a:chExt cx="0" cy="0"/>
-        </a:xfrm>
-      </p:grpSpPr>
-      <p:grpSp>
-        <p:nvGrpSpPr>
-          <p:cNvPr id="4" name="Group 3">
-            <a:extLst>
-              <a:ext uri="{FF2B5EF4-FFF2-40B4-BE49-F238E27FC236}">
-                <a16:creationId xmlns:a16="http://schemas.microsoft.com/office/drawing/2014/main" id="{D944BAA1-C6F8-40D8-9555-818F8267CF7F}"/>
-              </a:ext>
-            </a:extLst>
-          </p:cNvPr>
-          <p:cNvGrpSpPr/>
-          <p:nvPr/>
-        </p:nvGrpSpPr>
-        <p:grpSpPr>
-          <a:xfrm>
-            <a:off x="946331" y="151708"/>
-            <a:ext cx="7765143" cy="911430"/>
-            <a:chOff x="0" y="2405429"/>
-            <a:chExt cx="7765143" cy="911430"/>
-          </a:xfrm>
-        </p:grpSpPr>
-        <p:sp>
-          <p:nvSpPr>
-            <p:cNvPr id="5" name="Rectangle: Rounded Corners 4">
-              <a:extLst>
-                <a:ext uri="{FF2B5EF4-FFF2-40B4-BE49-F238E27FC236}">
-                  <a16:creationId xmlns:a16="http://schemas.microsoft.com/office/drawing/2014/main" id="{61EEB3F5-CF75-42ED-9C45-79AB7C3777BB}"/>
-                </a:ext>
-              </a:extLst>
-            </p:cNvPr>
-            <p:cNvSpPr/>
-            <p:nvPr/>
-          </p:nvSpPr>
-          <p:spPr>
-            <a:xfrm>
-              <a:off x="0" y="2405429"/>
-              <a:ext cx="7765143" cy="911430"/>
-            </a:xfrm>
-            <a:prstGeom prst="roundRect">
-              <a:avLst/>
-            </a:prstGeom>
-          </p:spPr>
-          <p:style>
-            <a:lnRef idx="0">
-              <a:schemeClr val="lt1">
-                <a:hueOff val="0"/>
-                <a:satOff val="0"/>
-                <a:lumOff val="0"/>
-                <a:alphaOff val="0"/>
-              </a:schemeClr>
-            </a:lnRef>
-            <a:fillRef idx="3">
-              <a:schemeClr val="accent4">
-                <a:hueOff val="0"/>
-                <a:satOff val="0"/>
-                <a:lumOff val="0"/>
-                <a:alphaOff val="0"/>
-              </a:schemeClr>
-            </a:fillRef>
-            <a:effectRef idx="2">
-              <a:schemeClr val="accent4">
-                <a:hueOff val="0"/>
-                <a:satOff val="0"/>
-                <a:lumOff val="0"/>
-                <a:alphaOff val="0"/>
-              </a:schemeClr>
-            </a:effectRef>
-            <a:fontRef idx="minor">
-              <a:schemeClr val="lt1"/>
-            </a:fontRef>
-          </p:style>
-        </p:sp>
-        <p:sp>
-          <p:nvSpPr>
-            <p:cNvPr id="6" name="Rectangle: Rounded Corners 4">
-              <a:extLst>
-                <a:ext uri="{FF2B5EF4-FFF2-40B4-BE49-F238E27FC236}">
-                  <a16:creationId xmlns:a16="http://schemas.microsoft.com/office/drawing/2014/main" id="{A6AE1549-2AE4-40DE-AF1C-EF8CD8CD4C27}"/>
-                </a:ext>
-              </a:extLst>
-            </p:cNvPr>
-            <p:cNvSpPr txBox="1"/>
-            <p:nvPr/>
-          </p:nvSpPr>
-          <p:spPr>
-            <a:xfrm>
-              <a:off x="44492" y="2449921"/>
-              <a:ext cx="7676159" cy="822446"/>
-            </a:xfrm>
-            <a:prstGeom prst="rect">
-              <a:avLst/>
-            </a:prstGeom>
-          </p:spPr>
-          <p:style>
-            <a:lnRef idx="0">
-              <a:scrgbClr r="0" g="0" b="0"/>
-            </a:lnRef>
-            <a:fillRef idx="0">
-              <a:scrgbClr r="0" g="0" b="0"/>
-            </a:fillRef>
-            <a:effectRef idx="0">
-              <a:scrgbClr r="0" g="0" b="0"/>
-            </a:effectRef>
-            <a:fontRef idx="minor">
-              <a:schemeClr val="lt1"/>
-            </a:fontRef>
-          </p:style>
-          <p:txBody>
-            <a:bodyPr spcFirstLastPara="0" vert="horz" wrap="square" lIns="144780" tIns="144780" rIns="144780" bIns="144780" numCol="1" spcCol="1270" anchor="ctr" anchorCtr="0">
-              <a:noAutofit/>
-            </a:bodyPr>
-            <a:lstStyle/>
-            <a:p>
-              <a:pPr marL="0" lvl="0" indent="0" algn="l" defTabSz="1689100">
-                <a:lnSpc>
-                  <a:spcPct val="90000"/>
-                </a:lnSpc>
-                <a:spcBef>
-                  <a:spcPct val="0"/>
-                </a:spcBef>
-                <a:spcAft>
-                  <a:spcPct val="35000"/>
-                </a:spcAft>
-                <a:buNone/>
-              </a:pPr>
-              <a:r>
-                <a:rPr lang="en-US" sz="3800" b="1" kern="1200">
-                  <a:latin typeface="Tahoma" panose="020B0604030504040204" pitchFamily="34" charset="0"/>
-                  <a:ea typeface="Tahoma" panose="020B0604030504040204" pitchFamily="34" charset="0"/>
-                  <a:cs typeface="Tahoma" panose="020B0604030504040204" pitchFamily="34" charset="0"/>
-                </a:rPr>
-                <a:t>Demo Point of Sale</a:t>
-              </a:r>
-              <a:endParaRPr lang="vi-VN" sz="3800" b="1" kern="1200" dirty="0">
-                <a:latin typeface="Tahoma" panose="020B0604030504040204" pitchFamily="34" charset="0"/>
-                <a:ea typeface="Tahoma" panose="020B0604030504040204" pitchFamily="34" charset="0"/>
-                <a:cs typeface="Tahoma" panose="020B0604030504040204" pitchFamily="34" charset="0"/>
-              </a:endParaRPr>
-            </a:p>
-          </p:txBody>
-        </p:sp>
-      </p:grpSp>
-      <p:sp>
-        <p:nvSpPr>
-          <p:cNvPr id="10" name="Rectangle 9">
-            <a:extLst>
-              <a:ext uri="{FF2B5EF4-FFF2-40B4-BE49-F238E27FC236}">
-                <a16:creationId xmlns:a16="http://schemas.microsoft.com/office/drawing/2014/main" id="{DA13A663-A660-4142-A601-35F4AB3CB6CB}"/>
-              </a:ext>
-            </a:extLst>
-          </p:cNvPr>
-          <p:cNvSpPr/>
-          <p:nvPr/>
-        </p:nvSpPr>
-        <p:spPr>
-          <a:xfrm>
-            <a:off x="1535456" y="1119427"/>
-            <a:ext cx="444352" cy="707886"/>
-          </a:xfrm>
-          <a:prstGeom prst="rect">
-            <a:avLst/>
-          </a:prstGeom>
-        </p:spPr>
-        <p:txBody>
-          <a:bodyPr wrap="none">
-            <a:spAutoFit/>
-          </a:bodyPr>
-          <a:lstStyle/>
-          <a:p>
-            <a:r>
-              <a:rPr lang="vi-VN" sz="4000" b="1" dirty="0">
-                <a:solidFill>
-                  <a:srgbClr val="21313A"/>
-                </a:solidFill>
-                <a:latin typeface="Work Sans"/>
-              </a:rPr>
-              <a:t>1</a:t>
-            </a:r>
-            <a:endParaRPr lang="vi-VN" sz="4000" b="1" i="0" dirty="0">
-              <a:solidFill>
-                <a:srgbClr val="21313A"/>
-              </a:solidFill>
-              <a:effectLst/>
-              <a:latin typeface="Work Sans"/>
-            </a:endParaRPr>
-          </a:p>
-        </p:txBody>
-      </p:sp>
-    </p:spTree>
-    <p:extLst>
-      <p:ext uri="{BB962C8B-B14F-4D97-AF65-F5344CB8AC3E}">
-        <p14:creationId xmlns:p14="http://schemas.microsoft.com/office/powerpoint/2010/main" val="3625150734"/>
-      </p:ext>
-    </p:extLst>
-  </p:cSld>
-  <p:clrMapOvr>
-    <a:masterClrMapping/>
-  </p:clrMapOvr>
-</p:sld>
-</file>
-
-<file path=ppt/slides/slide13.xml><?xml version="1.0" encoding="utf-8"?>
-<p:sld xmlns:a="http://schemas.openxmlformats.org/drawingml/2006/main" xmlns:r="http://schemas.openxmlformats.org/officeDocument/2006/relationships" xmlns:p="http://schemas.openxmlformats.org/presentationml/2006/main">
-  <p:cSld>
-    <p:spTree>
-      <p:nvGrpSpPr>
-        <p:cNvPr id="1" name=""/>
-        <p:cNvGrpSpPr/>
-        <p:nvPr/>
-      </p:nvGrpSpPr>
-      <p:grpSpPr>
-        <a:xfrm>
-          <a:off x="0" y="0"/>
-          <a:ext cx="0" cy="0"/>
-          <a:chOff x="0" y="0"/>
-          <a:chExt cx="0" cy="0"/>
-        </a:xfrm>
-      </p:grpSpPr>
-      <p:grpSp>
-        <p:nvGrpSpPr>
-          <p:cNvPr id="4" name="Group 3">
-            <a:extLst>
-              <a:ext uri="{FF2B5EF4-FFF2-40B4-BE49-F238E27FC236}">
-                <a16:creationId xmlns:a16="http://schemas.microsoft.com/office/drawing/2014/main" id="{D944BAA1-C6F8-40D8-9555-818F8267CF7F}"/>
-              </a:ext>
-            </a:extLst>
-          </p:cNvPr>
-          <p:cNvGrpSpPr/>
-          <p:nvPr/>
-        </p:nvGrpSpPr>
-        <p:grpSpPr>
-          <a:xfrm>
-            <a:off x="946331" y="151708"/>
-            <a:ext cx="7765143" cy="911430"/>
-            <a:chOff x="0" y="2405429"/>
-            <a:chExt cx="7765143" cy="911430"/>
-          </a:xfrm>
-        </p:grpSpPr>
-        <p:sp>
-          <p:nvSpPr>
-            <p:cNvPr id="5" name="Rectangle: Rounded Corners 4">
-              <a:extLst>
-                <a:ext uri="{FF2B5EF4-FFF2-40B4-BE49-F238E27FC236}">
-                  <a16:creationId xmlns:a16="http://schemas.microsoft.com/office/drawing/2014/main" id="{61EEB3F5-CF75-42ED-9C45-79AB7C3777BB}"/>
-                </a:ext>
-              </a:extLst>
-            </p:cNvPr>
-            <p:cNvSpPr/>
-            <p:nvPr/>
-          </p:nvSpPr>
-          <p:spPr>
-            <a:xfrm>
-              <a:off x="0" y="2405429"/>
-              <a:ext cx="7765143" cy="911430"/>
-            </a:xfrm>
-            <a:prstGeom prst="roundRect">
-              <a:avLst/>
-            </a:prstGeom>
-          </p:spPr>
-          <p:style>
-            <a:lnRef idx="0">
-              <a:schemeClr val="lt1">
-                <a:hueOff val="0"/>
-                <a:satOff val="0"/>
-                <a:lumOff val="0"/>
-                <a:alphaOff val="0"/>
-              </a:schemeClr>
-            </a:lnRef>
-            <a:fillRef idx="3">
-              <a:schemeClr val="accent4">
-                <a:hueOff val="0"/>
-                <a:satOff val="0"/>
-                <a:lumOff val="0"/>
-                <a:alphaOff val="0"/>
-              </a:schemeClr>
-            </a:fillRef>
-            <a:effectRef idx="2">
-              <a:schemeClr val="accent4">
-                <a:hueOff val="0"/>
-                <a:satOff val="0"/>
-                <a:lumOff val="0"/>
-                <a:alphaOff val="0"/>
-              </a:schemeClr>
-            </a:effectRef>
-            <a:fontRef idx="minor">
-              <a:schemeClr val="lt1"/>
-            </a:fontRef>
-          </p:style>
-        </p:sp>
-        <p:sp>
-          <p:nvSpPr>
-            <p:cNvPr id="6" name="Rectangle: Rounded Corners 4">
-              <a:extLst>
-                <a:ext uri="{FF2B5EF4-FFF2-40B4-BE49-F238E27FC236}">
-                  <a16:creationId xmlns:a16="http://schemas.microsoft.com/office/drawing/2014/main" id="{A6AE1549-2AE4-40DE-AF1C-EF8CD8CD4C27}"/>
-                </a:ext>
-              </a:extLst>
-            </p:cNvPr>
-            <p:cNvSpPr txBox="1"/>
-            <p:nvPr/>
-          </p:nvSpPr>
-          <p:spPr>
-            <a:xfrm>
-              <a:off x="44492" y="2449921"/>
-              <a:ext cx="7676159" cy="822446"/>
-            </a:xfrm>
-            <a:prstGeom prst="rect">
-              <a:avLst/>
-            </a:prstGeom>
-          </p:spPr>
-          <p:style>
-            <a:lnRef idx="0">
-              <a:scrgbClr r="0" g="0" b="0"/>
-            </a:lnRef>
-            <a:fillRef idx="0">
-              <a:scrgbClr r="0" g="0" b="0"/>
-            </a:fillRef>
-            <a:effectRef idx="0">
-              <a:scrgbClr r="0" g="0" b="0"/>
-            </a:effectRef>
-            <a:fontRef idx="minor">
-              <a:schemeClr val="lt1"/>
-            </a:fontRef>
-          </p:style>
-          <p:txBody>
-            <a:bodyPr spcFirstLastPara="0" vert="horz" wrap="square" lIns="144780" tIns="144780" rIns="144780" bIns="144780" numCol="1" spcCol="1270" anchor="ctr" anchorCtr="0">
-              <a:noAutofit/>
-            </a:bodyPr>
-            <a:lstStyle/>
-            <a:p>
-              <a:pPr marL="0" lvl="0" indent="0" algn="l" defTabSz="1689100">
-                <a:lnSpc>
-                  <a:spcPct val="90000"/>
-                </a:lnSpc>
-                <a:spcBef>
-                  <a:spcPct val="0"/>
-                </a:spcBef>
-                <a:spcAft>
-                  <a:spcPct val="35000"/>
-                </a:spcAft>
-                <a:buNone/>
-              </a:pPr>
-              <a:r>
-                <a:rPr lang="en-US" sz="3800" b="1" kern="1200">
-                  <a:latin typeface="Tahoma" panose="020B0604030504040204" pitchFamily="34" charset="0"/>
-                  <a:ea typeface="Tahoma" panose="020B0604030504040204" pitchFamily="34" charset="0"/>
-                  <a:cs typeface="Tahoma" panose="020B0604030504040204" pitchFamily="34" charset="0"/>
-                </a:rPr>
-                <a:t>Demo Point of Sale</a:t>
-              </a:r>
-              <a:endParaRPr lang="vi-VN" sz="3800" b="1" kern="1200" dirty="0">
-                <a:latin typeface="Tahoma" panose="020B0604030504040204" pitchFamily="34" charset="0"/>
-                <a:ea typeface="Tahoma" panose="020B0604030504040204" pitchFamily="34" charset="0"/>
-                <a:cs typeface="Tahoma" panose="020B0604030504040204" pitchFamily="34" charset="0"/>
-              </a:endParaRPr>
-            </a:p>
-          </p:txBody>
-        </p:sp>
-      </p:grpSp>
-      <p:sp>
-        <p:nvSpPr>
-          <p:cNvPr id="10" name="Rectangle 9">
-            <a:extLst>
-              <a:ext uri="{FF2B5EF4-FFF2-40B4-BE49-F238E27FC236}">
-                <a16:creationId xmlns:a16="http://schemas.microsoft.com/office/drawing/2014/main" id="{DA13A663-A660-4142-A601-35F4AB3CB6CB}"/>
-              </a:ext>
-            </a:extLst>
-          </p:cNvPr>
-          <p:cNvSpPr/>
-          <p:nvPr/>
-        </p:nvSpPr>
-        <p:spPr>
-          <a:xfrm>
-            <a:off x="1535456" y="1119427"/>
-            <a:ext cx="444352" cy="707886"/>
-          </a:xfrm>
-          <a:prstGeom prst="rect">
-            <a:avLst/>
-          </a:prstGeom>
-        </p:spPr>
-        <p:txBody>
-          <a:bodyPr wrap="none">
-            <a:spAutoFit/>
-          </a:bodyPr>
-          <a:lstStyle/>
-          <a:p>
-            <a:r>
-              <a:rPr lang="vi-VN" sz="4000" b="1" dirty="0">
-                <a:solidFill>
-                  <a:srgbClr val="21313A"/>
-                </a:solidFill>
-                <a:latin typeface="Work Sans"/>
-              </a:rPr>
-              <a:t>1</a:t>
-            </a:r>
-            <a:endParaRPr lang="vi-VN" sz="4000" b="1" i="0" dirty="0">
-              <a:solidFill>
-                <a:srgbClr val="21313A"/>
-              </a:solidFill>
-              <a:effectLst/>
-              <a:latin typeface="Work Sans"/>
-            </a:endParaRPr>
-          </a:p>
-        </p:txBody>
-      </p:sp>
-    </p:spTree>
-    <p:extLst>
-      <p:ext uri="{BB962C8B-B14F-4D97-AF65-F5344CB8AC3E}">
-        <p14:creationId xmlns:p14="http://schemas.microsoft.com/office/powerpoint/2010/main" val="1652948816"/>
-      </p:ext>
-    </p:extLst>
-  </p:cSld>
-  <p:clrMapOvr>
-    <a:masterClrMapping/>
-  </p:clrMapOvr>
-</p:sld>
-</file>
-
-<file path=ppt/slides/slide14.xml><?xml version="1.0" encoding="utf-8"?>
-<p:sld xmlns:a="http://schemas.openxmlformats.org/drawingml/2006/main" xmlns:r="http://schemas.openxmlformats.org/officeDocument/2006/relationships" xmlns:p="http://schemas.openxmlformats.org/presentationml/2006/main">
-  <p:cSld>
-    <p:spTree>
-      <p:nvGrpSpPr>
-        <p:cNvPr id="1" name=""/>
-        <p:cNvGrpSpPr/>
-        <p:nvPr/>
-      </p:nvGrpSpPr>
-      <p:grpSpPr>
-        <a:xfrm>
-          <a:off x="0" y="0"/>
-          <a:ext cx="0" cy="0"/>
-          <a:chOff x="0" y="0"/>
-          <a:chExt cx="0" cy="0"/>
-        </a:xfrm>
-      </p:grpSpPr>
-      <p:grpSp>
-        <p:nvGrpSpPr>
-          <p:cNvPr id="4" name="Group 3">
-            <a:extLst>
-              <a:ext uri="{FF2B5EF4-FFF2-40B4-BE49-F238E27FC236}">
-                <a16:creationId xmlns:a16="http://schemas.microsoft.com/office/drawing/2014/main" id="{D944BAA1-C6F8-40D8-9555-818F8267CF7F}"/>
-              </a:ext>
-            </a:extLst>
-          </p:cNvPr>
-          <p:cNvGrpSpPr/>
-          <p:nvPr/>
-        </p:nvGrpSpPr>
-        <p:grpSpPr>
-          <a:xfrm>
-            <a:off x="946331" y="151708"/>
-            <a:ext cx="7765143" cy="911430"/>
-            <a:chOff x="0" y="2405429"/>
-            <a:chExt cx="7765143" cy="911430"/>
-          </a:xfrm>
-        </p:grpSpPr>
-        <p:sp>
-          <p:nvSpPr>
-            <p:cNvPr id="5" name="Rectangle: Rounded Corners 4">
-              <a:extLst>
-                <a:ext uri="{FF2B5EF4-FFF2-40B4-BE49-F238E27FC236}">
-                  <a16:creationId xmlns:a16="http://schemas.microsoft.com/office/drawing/2014/main" id="{61EEB3F5-CF75-42ED-9C45-79AB7C3777BB}"/>
-                </a:ext>
-              </a:extLst>
-            </p:cNvPr>
-            <p:cNvSpPr/>
-            <p:nvPr/>
-          </p:nvSpPr>
-          <p:spPr>
-            <a:xfrm>
-              <a:off x="0" y="2405429"/>
-              <a:ext cx="7765143" cy="911430"/>
-            </a:xfrm>
-            <a:prstGeom prst="roundRect">
-              <a:avLst/>
-            </a:prstGeom>
-          </p:spPr>
-          <p:style>
-            <a:lnRef idx="0">
-              <a:schemeClr val="lt1">
-                <a:hueOff val="0"/>
-                <a:satOff val="0"/>
-                <a:lumOff val="0"/>
-                <a:alphaOff val="0"/>
-              </a:schemeClr>
-            </a:lnRef>
-            <a:fillRef idx="3">
-              <a:schemeClr val="accent4">
-                <a:hueOff val="0"/>
-                <a:satOff val="0"/>
-                <a:lumOff val="0"/>
-                <a:alphaOff val="0"/>
-              </a:schemeClr>
-            </a:fillRef>
-            <a:effectRef idx="2">
-              <a:schemeClr val="accent4">
-                <a:hueOff val="0"/>
-                <a:satOff val="0"/>
-                <a:lumOff val="0"/>
-                <a:alphaOff val="0"/>
-              </a:schemeClr>
-            </a:effectRef>
-            <a:fontRef idx="minor">
-              <a:schemeClr val="lt1"/>
-            </a:fontRef>
-          </p:style>
-        </p:sp>
-        <p:sp>
-          <p:nvSpPr>
-            <p:cNvPr id="6" name="Rectangle: Rounded Corners 4">
-              <a:extLst>
-                <a:ext uri="{FF2B5EF4-FFF2-40B4-BE49-F238E27FC236}">
-                  <a16:creationId xmlns:a16="http://schemas.microsoft.com/office/drawing/2014/main" id="{A6AE1549-2AE4-40DE-AF1C-EF8CD8CD4C27}"/>
-                </a:ext>
-              </a:extLst>
-            </p:cNvPr>
-            <p:cNvSpPr txBox="1"/>
-            <p:nvPr/>
-          </p:nvSpPr>
-          <p:spPr>
-            <a:xfrm>
-              <a:off x="44492" y="2449921"/>
-              <a:ext cx="7676159" cy="822446"/>
-            </a:xfrm>
-            <a:prstGeom prst="rect">
-              <a:avLst/>
-            </a:prstGeom>
-          </p:spPr>
-          <p:style>
-            <a:lnRef idx="0">
-              <a:scrgbClr r="0" g="0" b="0"/>
-            </a:lnRef>
-            <a:fillRef idx="0">
-              <a:scrgbClr r="0" g="0" b="0"/>
-            </a:fillRef>
-            <a:effectRef idx="0">
-              <a:scrgbClr r="0" g="0" b="0"/>
-            </a:effectRef>
-            <a:fontRef idx="minor">
-              <a:schemeClr val="lt1"/>
-            </a:fontRef>
-          </p:style>
-          <p:txBody>
-            <a:bodyPr spcFirstLastPara="0" vert="horz" wrap="square" lIns="144780" tIns="144780" rIns="144780" bIns="144780" numCol="1" spcCol="1270" anchor="ctr" anchorCtr="0">
-              <a:noAutofit/>
-            </a:bodyPr>
-            <a:lstStyle/>
-            <a:p>
-              <a:pPr marL="0" lvl="0" indent="0" algn="l" defTabSz="1689100">
-                <a:lnSpc>
-                  <a:spcPct val="90000"/>
-                </a:lnSpc>
-                <a:spcBef>
-                  <a:spcPct val="0"/>
-                </a:spcBef>
-                <a:spcAft>
-                  <a:spcPct val="35000"/>
-                </a:spcAft>
-                <a:buNone/>
-              </a:pPr>
-              <a:r>
-                <a:rPr lang="en-US" sz="3800" b="1" kern="1200">
-                  <a:latin typeface="Tahoma" panose="020B0604030504040204" pitchFamily="34" charset="0"/>
-                  <a:ea typeface="Tahoma" panose="020B0604030504040204" pitchFamily="34" charset="0"/>
-                  <a:cs typeface="Tahoma" panose="020B0604030504040204" pitchFamily="34" charset="0"/>
-                </a:rPr>
-                <a:t>Demo Point of Sale</a:t>
-              </a:r>
-              <a:endParaRPr lang="vi-VN" sz="3800" b="1" kern="1200" dirty="0">
-                <a:latin typeface="Tahoma" panose="020B0604030504040204" pitchFamily="34" charset="0"/>
-                <a:ea typeface="Tahoma" panose="020B0604030504040204" pitchFamily="34" charset="0"/>
-                <a:cs typeface="Tahoma" panose="020B0604030504040204" pitchFamily="34" charset="0"/>
-              </a:endParaRPr>
-            </a:p>
-          </p:txBody>
-        </p:sp>
-      </p:grpSp>
-      <p:sp>
-        <p:nvSpPr>
-          <p:cNvPr id="10" name="Rectangle 9">
-            <a:extLst>
-              <a:ext uri="{FF2B5EF4-FFF2-40B4-BE49-F238E27FC236}">
-                <a16:creationId xmlns:a16="http://schemas.microsoft.com/office/drawing/2014/main" id="{DA13A663-A660-4142-A601-35F4AB3CB6CB}"/>
-              </a:ext>
-            </a:extLst>
-          </p:cNvPr>
-          <p:cNvSpPr/>
-          <p:nvPr/>
-        </p:nvSpPr>
-        <p:spPr>
-          <a:xfrm>
-            <a:off x="1535456" y="1119427"/>
-            <a:ext cx="444352" cy="707886"/>
-          </a:xfrm>
-          <a:prstGeom prst="rect">
-            <a:avLst/>
-          </a:prstGeom>
-        </p:spPr>
-        <p:txBody>
-          <a:bodyPr wrap="none">
-            <a:spAutoFit/>
-          </a:bodyPr>
-          <a:lstStyle/>
-          <a:p>
-            <a:r>
-              <a:rPr lang="vi-VN" sz="4000" b="1" dirty="0">
-                <a:solidFill>
-                  <a:srgbClr val="21313A"/>
-                </a:solidFill>
-                <a:latin typeface="Work Sans"/>
-              </a:rPr>
-              <a:t>1</a:t>
-            </a:r>
-            <a:endParaRPr lang="vi-VN" sz="4000" b="1" i="0" dirty="0">
-              <a:solidFill>
-                <a:srgbClr val="21313A"/>
-              </a:solidFill>
-              <a:effectLst/>
-              <a:latin typeface="Work Sans"/>
-            </a:endParaRPr>
-          </a:p>
-        </p:txBody>
-      </p:sp>
-    </p:spTree>
-    <p:extLst>
-      <p:ext uri="{BB962C8B-B14F-4D97-AF65-F5344CB8AC3E}">
-        <p14:creationId xmlns:p14="http://schemas.microsoft.com/office/powerpoint/2010/main" val="1980008402"/>
-      </p:ext>
-    </p:extLst>
-  </p:cSld>
-  <p:clrMapOvr>
-    <a:masterClrMapping/>
-  </p:clrMapOvr>
-</p:sld>
-</file>
-
-<file path=ppt/slides/slide15.xml><?xml version="1.0" encoding="utf-8"?>
-<p:sld xmlns:a="http://schemas.openxmlformats.org/drawingml/2006/main" xmlns:r="http://schemas.openxmlformats.org/officeDocument/2006/relationships" xmlns:p="http://schemas.openxmlformats.org/presentationml/2006/main">
-  <p:cSld>
-    <p:spTree>
-      <p:nvGrpSpPr>
-        <p:cNvPr id="1" name=""/>
-        <p:cNvGrpSpPr/>
-        <p:nvPr/>
-      </p:nvGrpSpPr>
-      <p:grpSpPr>
-        <a:xfrm>
-          <a:off x="0" y="0"/>
-          <a:ext cx="0" cy="0"/>
-          <a:chOff x="0" y="0"/>
-          <a:chExt cx="0" cy="0"/>
-        </a:xfrm>
-      </p:grpSpPr>
-      <p:grpSp>
-        <p:nvGrpSpPr>
-          <p:cNvPr id="4" name="Group 3">
-            <a:extLst>
-              <a:ext uri="{FF2B5EF4-FFF2-40B4-BE49-F238E27FC236}">
-                <a16:creationId xmlns:a16="http://schemas.microsoft.com/office/drawing/2014/main" id="{D944BAA1-C6F8-40D8-9555-818F8267CF7F}"/>
-              </a:ext>
-            </a:extLst>
-          </p:cNvPr>
-          <p:cNvGrpSpPr/>
-          <p:nvPr/>
-        </p:nvGrpSpPr>
-        <p:grpSpPr>
-          <a:xfrm>
-            <a:off x="946331" y="151708"/>
-            <a:ext cx="7765143" cy="911430"/>
-            <a:chOff x="0" y="2405429"/>
-            <a:chExt cx="7765143" cy="911430"/>
-          </a:xfrm>
-        </p:grpSpPr>
-        <p:sp>
-          <p:nvSpPr>
-            <p:cNvPr id="5" name="Rectangle: Rounded Corners 4">
-              <a:extLst>
-                <a:ext uri="{FF2B5EF4-FFF2-40B4-BE49-F238E27FC236}">
-                  <a16:creationId xmlns:a16="http://schemas.microsoft.com/office/drawing/2014/main" id="{61EEB3F5-CF75-42ED-9C45-79AB7C3777BB}"/>
-                </a:ext>
-              </a:extLst>
-            </p:cNvPr>
-            <p:cNvSpPr/>
-            <p:nvPr/>
-          </p:nvSpPr>
-          <p:spPr>
-            <a:xfrm>
-              <a:off x="0" y="2405429"/>
-              <a:ext cx="7765143" cy="911430"/>
-            </a:xfrm>
-            <a:prstGeom prst="roundRect">
-              <a:avLst/>
-            </a:prstGeom>
-          </p:spPr>
-          <p:style>
-            <a:lnRef idx="0">
-              <a:schemeClr val="lt1">
-                <a:hueOff val="0"/>
-                <a:satOff val="0"/>
-                <a:lumOff val="0"/>
-                <a:alphaOff val="0"/>
-              </a:schemeClr>
-            </a:lnRef>
-            <a:fillRef idx="3">
-              <a:schemeClr val="accent4">
-                <a:hueOff val="0"/>
-                <a:satOff val="0"/>
-                <a:lumOff val="0"/>
-                <a:alphaOff val="0"/>
-              </a:schemeClr>
-            </a:fillRef>
-            <a:effectRef idx="2">
-              <a:schemeClr val="accent4">
-                <a:hueOff val="0"/>
-                <a:satOff val="0"/>
-                <a:lumOff val="0"/>
-                <a:alphaOff val="0"/>
-              </a:schemeClr>
-            </a:effectRef>
-            <a:fontRef idx="minor">
-              <a:schemeClr val="lt1"/>
-            </a:fontRef>
-          </p:style>
-        </p:sp>
-        <p:sp>
-          <p:nvSpPr>
-            <p:cNvPr id="6" name="Rectangle: Rounded Corners 4">
-              <a:extLst>
-                <a:ext uri="{FF2B5EF4-FFF2-40B4-BE49-F238E27FC236}">
-                  <a16:creationId xmlns:a16="http://schemas.microsoft.com/office/drawing/2014/main" id="{A6AE1549-2AE4-40DE-AF1C-EF8CD8CD4C27}"/>
-                </a:ext>
-              </a:extLst>
-            </p:cNvPr>
-            <p:cNvSpPr txBox="1"/>
-            <p:nvPr/>
-          </p:nvSpPr>
-          <p:spPr>
-            <a:xfrm>
-              <a:off x="44492" y="2449921"/>
-              <a:ext cx="7676159" cy="822446"/>
-            </a:xfrm>
-            <a:prstGeom prst="rect">
-              <a:avLst/>
-            </a:prstGeom>
-          </p:spPr>
-          <p:style>
-            <a:lnRef idx="0">
-              <a:scrgbClr r="0" g="0" b="0"/>
-            </a:lnRef>
-            <a:fillRef idx="0">
-              <a:scrgbClr r="0" g="0" b="0"/>
-            </a:fillRef>
-            <a:effectRef idx="0">
-              <a:scrgbClr r="0" g="0" b="0"/>
-            </a:effectRef>
-            <a:fontRef idx="minor">
-              <a:schemeClr val="lt1"/>
-            </a:fontRef>
-          </p:style>
-          <p:txBody>
-            <a:bodyPr spcFirstLastPara="0" vert="horz" wrap="square" lIns="144780" tIns="144780" rIns="144780" bIns="144780" numCol="1" spcCol="1270" anchor="ctr" anchorCtr="0">
-              <a:noAutofit/>
-            </a:bodyPr>
-            <a:lstStyle/>
-            <a:p>
-              <a:pPr marL="0" lvl="0" indent="0" algn="l" defTabSz="1689100">
-                <a:lnSpc>
-                  <a:spcPct val="90000"/>
-                </a:lnSpc>
-                <a:spcBef>
-                  <a:spcPct val="0"/>
-                </a:spcBef>
-                <a:spcAft>
-                  <a:spcPct val="35000"/>
-                </a:spcAft>
-                <a:buNone/>
-              </a:pPr>
-              <a:r>
-                <a:rPr lang="en-US" sz="3800" b="1" kern="1200">
-                  <a:latin typeface="Tahoma" panose="020B0604030504040204" pitchFamily="34" charset="0"/>
-                  <a:ea typeface="Tahoma" panose="020B0604030504040204" pitchFamily="34" charset="0"/>
-                  <a:cs typeface="Tahoma" panose="020B0604030504040204" pitchFamily="34" charset="0"/>
-                </a:rPr>
-                <a:t>Demo Point of Sale</a:t>
-              </a:r>
-              <a:endParaRPr lang="vi-VN" sz="3800" b="1" kern="1200" dirty="0">
-                <a:latin typeface="Tahoma" panose="020B0604030504040204" pitchFamily="34" charset="0"/>
-                <a:ea typeface="Tahoma" panose="020B0604030504040204" pitchFamily="34" charset="0"/>
-                <a:cs typeface="Tahoma" panose="020B0604030504040204" pitchFamily="34" charset="0"/>
-              </a:endParaRPr>
-            </a:p>
-          </p:txBody>
-        </p:sp>
-      </p:grpSp>
-      <p:sp>
-        <p:nvSpPr>
-          <p:cNvPr id="10" name="Rectangle 9">
-            <a:extLst>
-              <a:ext uri="{FF2B5EF4-FFF2-40B4-BE49-F238E27FC236}">
-                <a16:creationId xmlns:a16="http://schemas.microsoft.com/office/drawing/2014/main" id="{DA13A663-A660-4142-A601-35F4AB3CB6CB}"/>
-              </a:ext>
-            </a:extLst>
-          </p:cNvPr>
-          <p:cNvSpPr/>
-          <p:nvPr/>
-        </p:nvSpPr>
-        <p:spPr>
-          <a:xfrm>
-            <a:off x="1535456" y="1119427"/>
-            <a:ext cx="444352" cy="707886"/>
-          </a:xfrm>
-          <a:prstGeom prst="rect">
-            <a:avLst/>
-          </a:prstGeom>
-        </p:spPr>
-        <p:txBody>
-          <a:bodyPr wrap="none">
-            <a:spAutoFit/>
-          </a:bodyPr>
-          <a:lstStyle/>
-          <a:p>
-            <a:r>
-              <a:rPr lang="vi-VN" sz="4000" b="1" dirty="0">
-                <a:solidFill>
-                  <a:srgbClr val="21313A"/>
-                </a:solidFill>
-                <a:latin typeface="Work Sans"/>
-              </a:rPr>
-              <a:t>1</a:t>
-            </a:r>
-            <a:endParaRPr lang="vi-VN" sz="4000" b="1" i="0" dirty="0">
-              <a:solidFill>
-                <a:srgbClr val="21313A"/>
-              </a:solidFill>
-              <a:effectLst/>
-              <a:latin typeface="Work Sans"/>
-            </a:endParaRPr>
-          </a:p>
-        </p:txBody>
-      </p:sp>
-    </p:spTree>
-    <p:extLst>
-      <p:ext uri="{BB962C8B-B14F-4D97-AF65-F5344CB8AC3E}">
-        <p14:creationId xmlns:p14="http://schemas.microsoft.com/office/powerpoint/2010/main" val="3154395074"/>
-      </p:ext>
-    </p:extLst>
-  </p:cSld>
-  <p:clrMapOvr>
-    <a:masterClrMapping/>
-  </p:clrMapOvr>
-</p:sld>
-</file>
-
-<file path=ppt/slides/slide16.xml><?xml version="1.0" encoding="utf-8"?>
-<p:sld xmlns:a="http://schemas.openxmlformats.org/drawingml/2006/main" xmlns:r="http://schemas.openxmlformats.org/officeDocument/2006/relationships" xmlns:p="http://schemas.openxmlformats.org/presentationml/2006/main">
-  <p:cSld>
-    <p:spTree>
-      <p:nvGrpSpPr>
-        <p:cNvPr id="1" name=""/>
-        <p:cNvGrpSpPr/>
-        <p:nvPr/>
-      </p:nvGrpSpPr>
-      <p:grpSpPr>
-        <a:xfrm>
-          <a:off x="0" y="0"/>
-          <a:ext cx="0" cy="0"/>
-          <a:chOff x="0" y="0"/>
-          <a:chExt cx="0" cy="0"/>
-        </a:xfrm>
-      </p:grpSpPr>
-      <p:grpSp>
-        <p:nvGrpSpPr>
-          <p:cNvPr id="4" name="Group 3">
-            <a:extLst>
-              <a:ext uri="{FF2B5EF4-FFF2-40B4-BE49-F238E27FC236}">
-                <a16:creationId xmlns:a16="http://schemas.microsoft.com/office/drawing/2014/main" id="{D944BAA1-C6F8-40D8-9555-818F8267CF7F}"/>
-              </a:ext>
-            </a:extLst>
-          </p:cNvPr>
-          <p:cNvGrpSpPr/>
-          <p:nvPr/>
-        </p:nvGrpSpPr>
-        <p:grpSpPr>
-          <a:xfrm>
-            <a:off x="946331" y="151708"/>
-            <a:ext cx="7765143" cy="911430"/>
-            <a:chOff x="0" y="2405429"/>
-            <a:chExt cx="7765143" cy="911430"/>
-          </a:xfrm>
-        </p:grpSpPr>
-        <p:sp>
-          <p:nvSpPr>
-            <p:cNvPr id="5" name="Rectangle: Rounded Corners 4">
-              <a:extLst>
-                <a:ext uri="{FF2B5EF4-FFF2-40B4-BE49-F238E27FC236}">
-                  <a16:creationId xmlns:a16="http://schemas.microsoft.com/office/drawing/2014/main" id="{61EEB3F5-CF75-42ED-9C45-79AB7C3777BB}"/>
-                </a:ext>
-              </a:extLst>
-            </p:cNvPr>
-            <p:cNvSpPr/>
-            <p:nvPr/>
-          </p:nvSpPr>
-          <p:spPr>
-            <a:xfrm>
-              <a:off x="0" y="2405429"/>
-              <a:ext cx="7765143" cy="911430"/>
-            </a:xfrm>
-            <a:prstGeom prst="roundRect">
-              <a:avLst/>
-            </a:prstGeom>
-          </p:spPr>
-          <p:style>
-            <a:lnRef idx="0">
-              <a:schemeClr val="lt1">
-                <a:hueOff val="0"/>
-                <a:satOff val="0"/>
-                <a:lumOff val="0"/>
-                <a:alphaOff val="0"/>
-              </a:schemeClr>
-            </a:lnRef>
-            <a:fillRef idx="3">
-              <a:schemeClr val="accent4">
-                <a:hueOff val="0"/>
-                <a:satOff val="0"/>
-                <a:lumOff val="0"/>
-                <a:alphaOff val="0"/>
-              </a:schemeClr>
-            </a:fillRef>
-            <a:effectRef idx="2">
-              <a:schemeClr val="accent4">
-                <a:hueOff val="0"/>
-                <a:satOff val="0"/>
-                <a:lumOff val="0"/>
-                <a:alphaOff val="0"/>
-              </a:schemeClr>
-            </a:effectRef>
-            <a:fontRef idx="minor">
-              <a:schemeClr val="lt1"/>
-            </a:fontRef>
-          </p:style>
-        </p:sp>
-        <p:sp>
-          <p:nvSpPr>
-            <p:cNvPr id="6" name="Rectangle: Rounded Corners 4">
-              <a:extLst>
-                <a:ext uri="{FF2B5EF4-FFF2-40B4-BE49-F238E27FC236}">
-                  <a16:creationId xmlns:a16="http://schemas.microsoft.com/office/drawing/2014/main" id="{A6AE1549-2AE4-40DE-AF1C-EF8CD8CD4C27}"/>
-                </a:ext>
-              </a:extLst>
-            </p:cNvPr>
-            <p:cNvSpPr txBox="1"/>
-            <p:nvPr/>
-          </p:nvSpPr>
-          <p:spPr>
-            <a:xfrm>
-              <a:off x="44492" y="2449921"/>
-              <a:ext cx="7676159" cy="822446"/>
-            </a:xfrm>
-            <a:prstGeom prst="rect">
-              <a:avLst/>
-            </a:prstGeom>
-          </p:spPr>
-          <p:style>
-            <a:lnRef idx="0">
-              <a:scrgbClr r="0" g="0" b="0"/>
-            </a:lnRef>
-            <a:fillRef idx="0">
-              <a:scrgbClr r="0" g="0" b="0"/>
-            </a:fillRef>
-            <a:effectRef idx="0">
-              <a:scrgbClr r="0" g="0" b="0"/>
-            </a:effectRef>
-            <a:fontRef idx="minor">
-              <a:schemeClr val="lt1"/>
-            </a:fontRef>
-          </p:style>
-          <p:txBody>
-            <a:bodyPr spcFirstLastPara="0" vert="horz" wrap="square" lIns="144780" tIns="144780" rIns="144780" bIns="144780" numCol="1" spcCol="1270" anchor="ctr" anchorCtr="0">
-              <a:noAutofit/>
-            </a:bodyPr>
-            <a:lstStyle/>
-            <a:p>
-              <a:pPr marL="0" lvl="0" indent="0" algn="l" defTabSz="1689100">
-                <a:lnSpc>
-                  <a:spcPct val="90000"/>
-                </a:lnSpc>
-                <a:spcBef>
-                  <a:spcPct val="0"/>
-                </a:spcBef>
-                <a:spcAft>
-                  <a:spcPct val="35000"/>
-                </a:spcAft>
-                <a:buNone/>
-              </a:pPr>
-              <a:r>
-                <a:rPr lang="en-US" sz="3800" b="1" kern="1200">
-                  <a:latin typeface="Tahoma" panose="020B0604030504040204" pitchFamily="34" charset="0"/>
-                  <a:ea typeface="Tahoma" panose="020B0604030504040204" pitchFamily="34" charset="0"/>
-                  <a:cs typeface="Tahoma" panose="020B0604030504040204" pitchFamily="34" charset="0"/>
-                </a:rPr>
-                <a:t>Demo Point of Sale</a:t>
-              </a:r>
-              <a:endParaRPr lang="vi-VN" sz="3800" b="1" kern="1200" dirty="0">
-                <a:latin typeface="Tahoma" panose="020B0604030504040204" pitchFamily="34" charset="0"/>
-                <a:ea typeface="Tahoma" panose="020B0604030504040204" pitchFamily="34" charset="0"/>
-                <a:cs typeface="Tahoma" panose="020B0604030504040204" pitchFamily="34" charset="0"/>
-              </a:endParaRPr>
-            </a:p>
-          </p:txBody>
-        </p:sp>
-      </p:grpSp>
-      <p:sp>
-        <p:nvSpPr>
-          <p:cNvPr id="10" name="Rectangle 9">
-            <a:extLst>
-              <a:ext uri="{FF2B5EF4-FFF2-40B4-BE49-F238E27FC236}">
-                <a16:creationId xmlns:a16="http://schemas.microsoft.com/office/drawing/2014/main" id="{DA13A663-A660-4142-A601-35F4AB3CB6CB}"/>
-              </a:ext>
-            </a:extLst>
-          </p:cNvPr>
-          <p:cNvSpPr/>
-          <p:nvPr/>
-        </p:nvSpPr>
-        <p:spPr>
-          <a:xfrm>
-            <a:off x="1535456" y="1119427"/>
-            <a:ext cx="444352" cy="707886"/>
-          </a:xfrm>
-          <a:prstGeom prst="rect">
-            <a:avLst/>
-          </a:prstGeom>
-        </p:spPr>
-        <p:txBody>
-          <a:bodyPr wrap="none">
-            <a:spAutoFit/>
-          </a:bodyPr>
-          <a:lstStyle/>
-          <a:p>
-            <a:r>
-              <a:rPr lang="vi-VN" sz="4000" b="1" dirty="0">
-                <a:solidFill>
-                  <a:srgbClr val="21313A"/>
-                </a:solidFill>
-                <a:latin typeface="Work Sans"/>
-              </a:rPr>
-              <a:t>1</a:t>
-            </a:r>
-            <a:endParaRPr lang="vi-VN" sz="4000" b="1" i="0" dirty="0">
-              <a:solidFill>
-                <a:srgbClr val="21313A"/>
-              </a:solidFill>
-              <a:effectLst/>
-              <a:latin typeface="Work Sans"/>
-            </a:endParaRPr>
-          </a:p>
-        </p:txBody>
-      </p:sp>
-    </p:spTree>
-    <p:extLst>
-      <p:ext uri="{BB962C8B-B14F-4D97-AF65-F5344CB8AC3E}">
-        <p14:creationId xmlns:p14="http://schemas.microsoft.com/office/powerpoint/2010/main" val="1334569134"/>
-      </p:ext>
-    </p:extLst>
-  </p:cSld>
-  <p:clrMapOvr>
-    <a:masterClrMapping/>
-  </p:clrMapOvr>
-</p:sld>
-</file>
-
-<file path=ppt/slides/slide17.xml><?xml version="1.0" encoding="utf-8"?>
-<p:sld xmlns:a="http://schemas.openxmlformats.org/drawingml/2006/main" xmlns:r="http://schemas.openxmlformats.org/officeDocument/2006/relationships" xmlns:p="http://schemas.openxmlformats.org/presentationml/2006/main">
-  <p:cSld>
-    <p:spTree>
-      <p:nvGrpSpPr>
-        <p:cNvPr id="1" name=""/>
-        <p:cNvGrpSpPr/>
-        <p:nvPr/>
-      </p:nvGrpSpPr>
-      <p:grpSpPr>
-        <a:xfrm>
-          <a:off x="0" y="0"/>
-          <a:ext cx="0" cy="0"/>
-          <a:chOff x="0" y="0"/>
-          <a:chExt cx="0" cy="0"/>
-        </a:xfrm>
-      </p:grpSpPr>
-      <p:grpSp>
-        <p:nvGrpSpPr>
-          <p:cNvPr id="4" name="Group 3">
-            <a:extLst>
-              <a:ext uri="{FF2B5EF4-FFF2-40B4-BE49-F238E27FC236}">
-                <a16:creationId xmlns:a16="http://schemas.microsoft.com/office/drawing/2014/main" id="{D944BAA1-C6F8-40D8-9555-818F8267CF7F}"/>
-              </a:ext>
-            </a:extLst>
-          </p:cNvPr>
-          <p:cNvGrpSpPr/>
-          <p:nvPr/>
-        </p:nvGrpSpPr>
-        <p:grpSpPr>
-          <a:xfrm>
-            <a:off x="946331" y="151708"/>
-            <a:ext cx="7765143" cy="911430"/>
-            <a:chOff x="0" y="2405429"/>
-            <a:chExt cx="7765143" cy="911430"/>
-          </a:xfrm>
-        </p:grpSpPr>
-        <p:sp>
-          <p:nvSpPr>
-            <p:cNvPr id="5" name="Rectangle: Rounded Corners 4">
-              <a:extLst>
-                <a:ext uri="{FF2B5EF4-FFF2-40B4-BE49-F238E27FC236}">
-                  <a16:creationId xmlns:a16="http://schemas.microsoft.com/office/drawing/2014/main" id="{61EEB3F5-CF75-42ED-9C45-79AB7C3777BB}"/>
-                </a:ext>
-              </a:extLst>
-            </p:cNvPr>
-            <p:cNvSpPr/>
-            <p:nvPr/>
-          </p:nvSpPr>
-          <p:spPr>
-            <a:xfrm>
-              <a:off x="0" y="2405429"/>
-              <a:ext cx="7765143" cy="911430"/>
-            </a:xfrm>
-            <a:prstGeom prst="roundRect">
-              <a:avLst/>
-            </a:prstGeom>
-          </p:spPr>
-          <p:style>
-            <a:lnRef idx="0">
-              <a:schemeClr val="lt1">
-                <a:hueOff val="0"/>
-                <a:satOff val="0"/>
-                <a:lumOff val="0"/>
-                <a:alphaOff val="0"/>
-              </a:schemeClr>
-            </a:lnRef>
-            <a:fillRef idx="3">
-              <a:schemeClr val="accent4">
-                <a:hueOff val="0"/>
-                <a:satOff val="0"/>
-                <a:lumOff val="0"/>
-                <a:alphaOff val="0"/>
-              </a:schemeClr>
-            </a:fillRef>
-            <a:effectRef idx="2">
-              <a:schemeClr val="accent4">
-                <a:hueOff val="0"/>
-                <a:satOff val="0"/>
-                <a:lumOff val="0"/>
-                <a:alphaOff val="0"/>
-              </a:schemeClr>
-            </a:effectRef>
-            <a:fontRef idx="minor">
-              <a:schemeClr val="lt1"/>
-            </a:fontRef>
-          </p:style>
-        </p:sp>
-        <p:sp>
-          <p:nvSpPr>
-            <p:cNvPr id="6" name="Rectangle: Rounded Corners 4">
-              <a:extLst>
-                <a:ext uri="{FF2B5EF4-FFF2-40B4-BE49-F238E27FC236}">
-                  <a16:creationId xmlns:a16="http://schemas.microsoft.com/office/drawing/2014/main" id="{A6AE1549-2AE4-40DE-AF1C-EF8CD8CD4C27}"/>
-                </a:ext>
-              </a:extLst>
-            </p:cNvPr>
-            <p:cNvSpPr txBox="1"/>
-            <p:nvPr/>
-          </p:nvSpPr>
-          <p:spPr>
-            <a:xfrm>
-              <a:off x="44492" y="2449921"/>
-              <a:ext cx="7676159" cy="822446"/>
-            </a:xfrm>
-            <a:prstGeom prst="rect">
-              <a:avLst/>
-            </a:prstGeom>
-          </p:spPr>
-          <p:style>
-            <a:lnRef idx="0">
-              <a:scrgbClr r="0" g="0" b="0"/>
-            </a:lnRef>
-            <a:fillRef idx="0">
-              <a:scrgbClr r="0" g="0" b="0"/>
-            </a:fillRef>
-            <a:effectRef idx="0">
-              <a:scrgbClr r="0" g="0" b="0"/>
-            </a:effectRef>
-            <a:fontRef idx="minor">
-              <a:schemeClr val="lt1"/>
-            </a:fontRef>
-          </p:style>
-          <p:txBody>
-            <a:bodyPr spcFirstLastPara="0" vert="horz" wrap="square" lIns="144780" tIns="144780" rIns="144780" bIns="144780" numCol="1" spcCol="1270" anchor="ctr" anchorCtr="0">
-              <a:noAutofit/>
-            </a:bodyPr>
-            <a:lstStyle/>
-            <a:p>
-              <a:pPr marL="0" lvl="0" indent="0" algn="l" defTabSz="1689100">
-                <a:lnSpc>
-                  <a:spcPct val="90000"/>
-                </a:lnSpc>
-                <a:spcBef>
-                  <a:spcPct val="0"/>
-                </a:spcBef>
-                <a:spcAft>
-                  <a:spcPct val="35000"/>
-                </a:spcAft>
-                <a:buNone/>
-              </a:pPr>
-              <a:r>
-                <a:rPr lang="en-US" sz="3800" b="1" kern="1200">
-                  <a:latin typeface="Tahoma" panose="020B0604030504040204" pitchFamily="34" charset="0"/>
-                  <a:ea typeface="Tahoma" panose="020B0604030504040204" pitchFamily="34" charset="0"/>
-                  <a:cs typeface="Tahoma" panose="020B0604030504040204" pitchFamily="34" charset="0"/>
-                </a:rPr>
-                <a:t>Demo Point of Sale</a:t>
-              </a:r>
-              <a:endParaRPr lang="vi-VN" sz="3800" b="1" kern="1200" dirty="0">
-                <a:latin typeface="Tahoma" panose="020B0604030504040204" pitchFamily="34" charset="0"/>
-                <a:ea typeface="Tahoma" panose="020B0604030504040204" pitchFamily="34" charset="0"/>
-                <a:cs typeface="Tahoma" panose="020B0604030504040204" pitchFamily="34" charset="0"/>
-              </a:endParaRPr>
-            </a:p>
-          </p:txBody>
-        </p:sp>
-      </p:grpSp>
-      <p:sp>
-        <p:nvSpPr>
-          <p:cNvPr id="10" name="Rectangle 9">
-            <a:extLst>
-              <a:ext uri="{FF2B5EF4-FFF2-40B4-BE49-F238E27FC236}">
-                <a16:creationId xmlns:a16="http://schemas.microsoft.com/office/drawing/2014/main" id="{DA13A663-A660-4142-A601-35F4AB3CB6CB}"/>
-              </a:ext>
-            </a:extLst>
-          </p:cNvPr>
-          <p:cNvSpPr/>
-          <p:nvPr/>
-        </p:nvSpPr>
-        <p:spPr>
-          <a:xfrm>
-            <a:off x="1535456" y="1119427"/>
-            <a:ext cx="444352" cy="707886"/>
-          </a:xfrm>
-          <a:prstGeom prst="rect">
-            <a:avLst/>
-          </a:prstGeom>
-        </p:spPr>
-        <p:txBody>
-          <a:bodyPr wrap="none">
-            <a:spAutoFit/>
-          </a:bodyPr>
-          <a:lstStyle/>
-          <a:p>
-            <a:r>
-              <a:rPr lang="vi-VN" sz="4000" b="1" dirty="0">
-                <a:solidFill>
-                  <a:srgbClr val="21313A"/>
-                </a:solidFill>
-                <a:latin typeface="Work Sans"/>
-              </a:rPr>
-              <a:t>1</a:t>
-            </a:r>
-            <a:endParaRPr lang="vi-VN" sz="4000" b="1" i="0" dirty="0">
-              <a:solidFill>
-                <a:srgbClr val="21313A"/>
-              </a:solidFill>
-              <a:effectLst/>
-              <a:latin typeface="Work Sans"/>
-            </a:endParaRPr>
-          </a:p>
-        </p:txBody>
-      </p:sp>
-    </p:spTree>
-    <p:extLst>
-      <p:ext uri="{BB962C8B-B14F-4D97-AF65-F5344CB8AC3E}">
-        <p14:creationId xmlns:p14="http://schemas.microsoft.com/office/powerpoint/2010/main" val="392971989"/>
-      </p:ext>
-    </p:extLst>
-  </p:cSld>
-  <p:clrMapOvr>
-    <a:masterClrMapping/>
-  </p:clrMapOvr>
-</p:sld>
-</file>
-
-<file path=ppt/slides/slide18.xml><?xml version="1.0" encoding="utf-8"?>
-<p:sld xmlns:a="http://schemas.openxmlformats.org/drawingml/2006/main" xmlns:r="http://schemas.openxmlformats.org/officeDocument/2006/relationships" xmlns:p="http://schemas.openxmlformats.org/presentationml/2006/main">
-  <p:cSld>
-    <p:spTree>
-      <p:nvGrpSpPr>
-        <p:cNvPr id="1" name=""/>
-        <p:cNvGrpSpPr/>
-        <p:nvPr/>
-      </p:nvGrpSpPr>
-      <p:grpSpPr>
-        <a:xfrm>
-          <a:off x="0" y="0"/>
-          <a:ext cx="0" cy="0"/>
-          <a:chOff x="0" y="0"/>
-          <a:chExt cx="0" cy="0"/>
-        </a:xfrm>
-      </p:grpSpPr>
-      <p:grpSp>
-        <p:nvGrpSpPr>
-          <p:cNvPr id="4" name="Group 3">
-            <a:extLst>
-              <a:ext uri="{FF2B5EF4-FFF2-40B4-BE49-F238E27FC236}">
-                <a16:creationId xmlns:a16="http://schemas.microsoft.com/office/drawing/2014/main" id="{D944BAA1-C6F8-40D8-9555-818F8267CF7F}"/>
-              </a:ext>
-            </a:extLst>
-          </p:cNvPr>
-          <p:cNvGrpSpPr/>
-          <p:nvPr/>
-        </p:nvGrpSpPr>
-        <p:grpSpPr>
-          <a:xfrm>
-            <a:off x="946331" y="151708"/>
-            <a:ext cx="7765143" cy="911430"/>
-            <a:chOff x="0" y="2405429"/>
-            <a:chExt cx="7765143" cy="911430"/>
-          </a:xfrm>
-        </p:grpSpPr>
-        <p:sp>
-          <p:nvSpPr>
-            <p:cNvPr id="5" name="Rectangle: Rounded Corners 4">
-              <a:extLst>
-                <a:ext uri="{FF2B5EF4-FFF2-40B4-BE49-F238E27FC236}">
-                  <a16:creationId xmlns:a16="http://schemas.microsoft.com/office/drawing/2014/main" id="{61EEB3F5-CF75-42ED-9C45-79AB7C3777BB}"/>
-                </a:ext>
-              </a:extLst>
-            </p:cNvPr>
-            <p:cNvSpPr/>
-            <p:nvPr/>
-          </p:nvSpPr>
-          <p:spPr>
-            <a:xfrm>
-              <a:off x="0" y="2405429"/>
-              <a:ext cx="7765143" cy="911430"/>
-            </a:xfrm>
-            <a:prstGeom prst="roundRect">
-              <a:avLst/>
-            </a:prstGeom>
-          </p:spPr>
-          <p:style>
-            <a:lnRef idx="0">
-              <a:schemeClr val="lt1">
-                <a:hueOff val="0"/>
-                <a:satOff val="0"/>
-                <a:lumOff val="0"/>
-                <a:alphaOff val="0"/>
-              </a:schemeClr>
-            </a:lnRef>
-            <a:fillRef idx="3">
-              <a:schemeClr val="accent4">
-                <a:hueOff val="0"/>
-                <a:satOff val="0"/>
-                <a:lumOff val="0"/>
-                <a:alphaOff val="0"/>
-              </a:schemeClr>
-            </a:fillRef>
-            <a:effectRef idx="2">
-              <a:schemeClr val="accent4">
-                <a:hueOff val="0"/>
-                <a:satOff val="0"/>
-                <a:lumOff val="0"/>
-                <a:alphaOff val="0"/>
-              </a:schemeClr>
-            </a:effectRef>
-            <a:fontRef idx="minor">
-              <a:schemeClr val="lt1"/>
-            </a:fontRef>
-          </p:style>
-        </p:sp>
-        <p:sp>
-          <p:nvSpPr>
-            <p:cNvPr id="6" name="Rectangle: Rounded Corners 4">
-              <a:extLst>
-                <a:ext uri="{FF2B5EF4-FFF2-40B4-BE49-F238E27FC236}">
-                  <a16:creationId xmlns:a16="http://schemas.microsoft.com/office/drawing/2014/main" id="{A6AE1549-2AE4-40DE-AF1C-EF8CD8CD4C27}"/>
-                </a:ext>
-              </a:extLst>
-            </p:cNvPr>
-            <p:cNvSpPr txBox="1"/>
-            <p:nvPr/>
-          </p:nvSpPr>
-          <p:spPr>
-            <a:xfrm>
-              <a:off x="44492" y="2449921"/>
-              <a:ext cx="7676159" cy="822446"/>
-            </a:xfrm>
-            <a:prstGeom prst="rect">
-              <a:avLst/>
-            </a:prstGeom>
-          </p:spPr>
-          <p:style>
-            <a:lnRef idx="0">
-              <a:scrgbClr r="0" g="0" b="0"/>
-            </a:lnRef>
-            <a:fillRef idx="0">
-              <a:scrgbClr r="0" g="0" b="0"/>
-            </a:fillRef>
-            <a:effectRef idx="0">
-              <a:scrgbClr r="0" g="0" b="0"/>
-            </a:effectRef>
-            <a:fontRef idx="minor">
-              <a:schemeClr val="lt1"/>
-            </a:fontRef>
-          </p:style>
-          <p:txBody>
-            <a:bodyPr spcFirstLastPara="0" vert="horz" wrap="square" lIns="144780" tIns="144780" rIns="144780" bIns="144780" numCol="1" spcCol="1270" anchor="ctr" anchorCtr="0">
-              <a:noAutofit/>
-            </a:bodyPr>
-            <a:lstStyle/>
-            <a:p>
-              <a:pPr marL="0" lvl="0" indent="0" algn="l" defTabSz="1689100">
-                <a:lnSpc>
-                  <a:spcPct val="90000"/>
-                </a:lnSpc>
-                <a:spcBef>
-                  <a:spcPct val="0"/>
-                </a:spcBef>
-                <a:spcAft>
-                  <a:spcPct val="35000"/>
-                </a:spcAft>
-                <a:buNone/>
-              </a:pPr>
-              <a:r>
-                <a:rPr lang="en-US" sz="3800" b="1" kern="1200">
-                  <a:latin typeface="Tahoma" panose="020B0604030504040204" pitchFamily="34" charset="0"/>
-                  <a:ea typeface="Tahoma" panose="020B0604030504040204" pitchFamily="34" charset="0"/>
-                  <a:cs typeface="Tahoma" panose="020B0604030504040204" pitchFamily="34" charset="0"/>
-                </a:rPr>
-                <a:t>Demo Point of Sale</a:t>
-              </a:r>
-              <a:endParaRPr lang="vi-VN" sz="3800" b="1" kern="1200" dirty="0">
-                <a:latin typeface="Tahoma" panose="020B0604030504040204" pitchFamily="34" charset="0"/>
-                <a:ea typeface="Tahoma" panose="020B0604030504040204" pitchFamily="34" charset="0"/>
-                <a:cs typeface="Tahoma" panose="020B0604030504040204" pitchFamily="34" charset="0"/>
-              </a:endParaRPr>
-            </a:p>
-          </p:txBody>
-        </p:sp>
-      </p:grpSp>
-      <p:sp>
-        <p:nvSpPr>
-          <p:cNvPr id="10" name="Rectangle 9">
-            <a:extLst>
-              <a:ext uri="{FF2B5EF4-FFF2-40B4-BE49-F238E27FC236}">
-                <a16:creationId xmlns:a16="http://schemas.microsoft.com/office/drawing/2014/main" id="{DA13A663-A660-4142-A601-35F4AB3CB6CB}"/>
-              </a:ext>
-            </a:extLst>
-          </p:cNvPr>
-          <p:cNvSpPr/>
-          <p:nvPr/>
-        </p:nvSpPr>
-        <p:spPr>
-          <a:xfrm>
-            <a:off x="1535456" y="1119427"/>
-            <a:ext cx="444352" cy="707886"/>
-          </a:xfrm>
-          <a:prstGeom prst="rect">
-            <a:avLst/>
-          </a:prstGeom>
-        </p:spPr>
-        <p:txBody>
-          <a:bodyPr wrap="none">
-            <a:spAutoFit/>
-          </a:bodyPr>
-          <a:lstStyle/>
-          <a:p>
-            <a:r>
-              <a:rPr lang="vi-VN" sz="4000" b="1" dirty="0">
-                <a:solidFill>
-                  <a:srgbClr val="21313A"/>
-                </a:solidFill>
-                <a:latin typeface="Work Sans"/>
-              </a:rPr>
-              <a:t>1</a:t>
-            </a:r>
-            <a:endParaRPr lang="vi-VN" sz="4000" b="1" i="0" dirty="0">
-              <a:solidFill>
-                <a:srgbClr val="21313A"/>
-              </a:solidFill>
-              <a:effectLst/>
-              <a:latin typeface="Work Sans"/>
-            </a:endParaRPr>
-          </a:p>
-        </p:txBody>
-      </p:sp>
-    </p:spTree>
-    <p:extLst>
-      <p:ext uri="{BB962C8B-B14F-4D97-AF65-F5344CB8AC3E}">
-        <p14:creationId xmlns:p14="http://schemas.microsoft.com/office/powerpoint/2010/main" val="209040257"/>
-      </p:ext>
-    </p:extLst>
-  </p:cSld>
-  <p:clrMapOvr>
-    <a:masterClrMapping/>
-  </p:clrMapOvr>
-</p:sld>
-</file>
-
-<file path=ppt/slides/slide19.xml><?xml version="1.0" encoding="utf-8"?>
-<p:sld xmlns:a="http://schemas.openxmlformats.org/drawingml/2006/main" xmlns:r="http://schemas.openxmlformats.org/officeDocument/2006/relationships" xmlns:p="http://schemas.openxmlformats.org/presentationml/2006/main">
-  <p:cSld>
-    <p:spTree>
-      <p:nvGrpSpPr>
-        <p:cNvPr id="1" name=""/>
-        <p:cNvGrpSpPr/>
-        <p:nvPr/>
-      </p:nvGrpSpPr>
-      <p:grpSpPr>
-        <a:xfrm>
-          <a:off x="0" y="0"/>
-          <a:ext cx="0" cy="0"/>
-          <a:chOff x="0" y="0"/>
-          <a:chExt cx="0" cy="0"/>
-        </a:xfrm>
-      </p:grpSpPr>
-      <p:grpSp>
-        <p:nvGrpSpPr>
-          <p:cNvPr id="4" name="Group 3">
-            <a:extLst>
-              <a:ext uri="{FF2B5EF4-FFF2-40B4-BE49-F238E27FC236}">
-                <a16:creationId xmlns:a16="http://schemas.microsoft.com/office/drawing/2014/main" id="{D944BAA1-C6F8-40D8-9555-818F8267CF7F}"/>
-              </a:ext>
-            </a:extLst>
-          </p:cNvPr>
-          <p:cNvGrpSpPr/>
-          <p:nvPr/>
-        </p:nvGrpSpPr>
-        <p:grpSpPr>
-          <a:xfrm>
-            <a:off x="946331" y="151708"/>
-            <a:ext cx="7765143" cy="911430"/>
-            <a:chOff x="0" y="2405429"/>
-            <a:chExt cx="7765143" cy="911430"/>
-          </a:xfrm>
-        </p:grpSpPr>
-        <p:sp>
-          <p:nvSpPr>
-            <p:cNvPr id="5" name="Rectangle: Rounded Corners 4">
-              <a:extLst>
-                <a:ext uri="{FF2B5EF4-FFF2-40B4-BE49-F238E27FC236}">
-                  <a16:creationId xmlns:a16="http://schemas.microsoft.com/office/drawing/2014/main" id="{61EEB3F5-CF75-42ED-9C45-79AB7C3777BB}"/>
-                </a:ext>
-              </a:extLst>
-            </p:cNvPr>
-            <p:cNvSpPr/>
-            <p:nvPr/>
-          </p:nvSpPr>
-          <p:spPr>
-            <a:xfrm>
-              <a:off x="0" y="2405429"/>
-              <a:ext cx="7765143" cy="911430"/>
-            </a:xfrm>
-            <a:prstGeom prst="roundRect">
-              <a:avLst/>
-            </a:prstGeom>
-          </p:spPr>
-          <p:style>
-            <a:lnRef idx="0">
-              <a:schemeClr val="lt1">
-                <a:hueOff val="0"/>
-                <a:satOff val="0"/>
-                <a:lumOff val="0"/>
-                <a:alphaOff val="0"/>
-              </a:schemeClr>
-            </a:lnRef>
-            <a:fillRef idx="3">
-              <a:schemeClr val="accent4">
-                <a:hueOff val="0"/>
-                <a:satOff val="0"/>
-                <a:lumOff val="0"/>
-                <a:alphaOff val="0"/>
-              </a:schemeClr>
-            </a:fillRef>
-            <a:effectRef idx="2">
-              <a:schemeClr val="accent4">
-                <a:hueOff val="0"/>
-                <a:satOff val="0"/>
-                <a:lumOff val="0"/>
-                <a:alphaOff val="0"/>
-              </a:schemeClr>
-            </a:effectRef>
-            <a:fontRef idx="minor">
-              <a:schemeClr val="lt1"/>
-            </a:fontRef>
-          </p:style>
-        </p:sp>
-        <p:sp>
-          <p:nvSpPr>
-            <p:cNvPr id="6" name="Rectangle: Rounded Corners 4">
-              <a:extLst>
-                <a:ext uri="{FF2B5EF4-FFF2-40B4-BE49-F238E27FC236}">
-                  <a16:creationId xmlns:a16="http://schemas.microsoft.com/office/drawing/2014/main" id="{A6AE1549-2AE4-40DE-AF1C-EF8CD8CD4C27}"/>
-                </a:ext>
-              </a:extLst>
-            </p:cNvPr>
-            <p:cNvSpPr txBox="1"/>
-            <p:nvPr/>
-          </p:nvSpPr>
-          <p:spPr>
-            <a:xfrm>
-              <a:off x="44492" y="2449921"/>
-              <a:ext cx="7676159" cy="822446"/>
-            </a:xfrm>
-            <a:prstGeom prst="rect">
-              <a:avLst/>
-            </a:prstGeom>
-          </p:spPr>
-          <p:style>
-            <a:lnRef idx="0">
-              <a:scrgbClr r="0" g="0" b="0"/>
-            </a:lnRef>
-            <a:fillRef idx="0">
-              <a:scrgbClr r="0" g="0" b="0"/>
-            </a:fillRef>
-            <a:effectRef idx="0">
-              <a:scrgbClr r="0" g="0" b="0"/>
-            </a:effectRef>
-            <a:fontRef idx="minor">
-              <a:schemeClr val="lt1"/>
-            </a:fontRef>
-          </p:style>
-          <p:txBody>
-            <a:bodyPr spcFirstLastPara="0" vert="horz" wrap="square" lIns="144780" tIns="144780" rIns="144780" bIns="144780" numCol="1" spcCol="1270" anchor="ctr" anchorCtr="0">
-              <a:noAutofit/>
-            </a:bodyPr>
-            <a:lstStyle/>
-            <a:p>
-              <a:pPr marL="0" lvl="0" indent="0" algn="l" defTabSz="1689100">
-                <a:lnSpc>
-                  <a:spcPct val="90000"/>
-                </a:lnSpc>
-                <a:spcBef>
-                  <a:spcPct val="0"/>
-                </a:spcBef>
-                <a:spcAft>
-                  <a:spcPct val="35000"/>
-                </a:spcAft>
-                <a:buNone/>
-              </a:pPr>
-              <a:r>
-                <a:rPr lang="en-US" sz="3800" b="1" kern="1200">
-                  <a:latin typeface="Tahoma" panose="020B0604030504040204" pitchFamily="34" charset="0"/>
-                  <a:ea typeface="Tahoma" panose="020B0604030504040204" pitchFamily="34" charset="0"/>
-                  <a:cs typeface="Tahoma" panose="020B0604030504040204" pitchFamily="34" charset="0"/>
-                </a:rPr>
-                <a:t>Demo Point of Sale</a:t>
-              </a:r>
-              <a:endParaRPr lang="vi-VN" sz="3800" b="1" kern="1200" dirty="0">
-                <a:latin typeface="Tahoma" panose="020B0604030504040204" pitchFamily="34" charset="0"/>
-                <a:ea typeface="Tahoma" panose="020B0604030504040204" pitchFamily="34" charset="0"/>
-                <a:cs typeface="Tahoma" panose="020B0604030504040204" pitchFamily="34" charset="0"/>
-              </a:endParaRPr>
-            </a:p>
-          </p:txBody>
-        </p:sp>
-      </p:grpSp>
-      <p:sp>
-        <p:nvSpPr>
-          <p:cNvPr id="10" name="Rectangle 9">
-            <a:extLst>
-              <a:ext uri="{FF2B5EF4-FFF2-40B4-BE49-F238E27FC236}">
-                <a16:creationId xmlns:a16="http://schemas.microsoft.com/office/drawing/2014/main" id="{DA13A663-A660-4142-A601-35F4AB3CB6CB}"/>
-              </a:ext>
-            </a:extLst>
-          </p:cNvPr>
-          <p:cNvSpPr/>
-          <p:nvPr/>
-        </p:nvSpPr>
-        <p:spPr>
-          <a:xfrm>
-            <a:off x="1535456" y="1119427"/>
-            <a:ext cx="444352" cy="707886"/>
-          </a:xfrm>
-          <a:prstGeom prst="rect">
-            <a:avLst/>
-          </a:prstGeom>
-        </p:spPr>
-        <p:txBody>
-          <a:bodyPr wrap="none">
-            <a:spAutoFit/>
-          </a:bodyPr>
-          <a:lstStyle/>
-          <a:p>
-            <a:r>
-              <a:rPr lang="vi-VN" sz="4000" b="1" dirty="0">
-                <a:solidFill>
-                  <a:srgbClr val="21313A"/>
-                </a:solidFill>
-                <a:latin typeface="Work Sans"/>
-              </a:rPr>
-              <a:t>1</a:t>
-            </a:r>
-            <a:endParaRPr lang="vi-VN" sz="4000" b="1" i="0" dirty="0">
-              <a:solidFill>
-                <a:srgbClr val="21313A"/>
-              </a:solidFill>
-              <a:effectLst/>
-              <a:latin typeface="Work Sans"/>
-            </a:endParaRPr>
-          </a:p>
-        </p:txBody>
-      </p:sp>
-    </p:spTree>
-    <p:extLst>
-      <p:ext uri="{BB962C8B-B14F-4D97-AF65-F5344CB8AC3E}">
-        <p14:creationId xmlns:p14="http://schemas.microsoft.com/office/powerpoint/2010/main" val="842673443"/>
-      </p:ext>
-    </p:extLst>
-  </p:cSld>
-  <p:clrMapOvr>
-    <a:masterClrMapping/>
-  </p:clrMapOvr>
-</p:sld>
-</file>
-
-<file path=ppt/slides/slide2.xml><?xml version="1.0" encoding="utf-8"?>
-<p:sld xmlns:a="http://schemas.openxmlformats.org/drawingml/2006/main" xmlns:r="http://schemas.openxmlformats.org/officeDocument/2006/relationships" xmlns:p="http://schemas.openxmlformats.org/presentationml/2006/main">
-  <p:cSld>
-    <p:spTree>
-      <p:nvGrpSpPr>
-        <p:cNvPr id="1" name=""/>
-        <p:cNvGrpSpPr/>
-        <p:nvPr/>
-      </p:nvGrpSpPr>
-      <p:grpSpPr>
-        <a:xfrm>
-          <a:off x="0" y="0"/>
-          <a:ext cx="0" cy="0"/>
-          <a:chOff x="0" y="0"/>
-          <a:chExt cx="0" cy="0"/>
-        </a:xfrm>
-      </p:grpSpPr>
-      <p:sp>
-        <p:nvSpPr>
-          <p:cNvPr id="2" name="Title 1">
-            <a:extLst>
-              <a:ext uri="{FF2B5EF4-FFF2-40B4-BE49-F238E27FC236}">
-                <a16:creationId xmlns:a16="http://schemas.microsoft.com/office/drawing/2014/main" id="{B0A6BCEB-2D1F-41E9-AB57-DB322861DFAB}"/>
-              </a:ext>
-            </a:extLst>
-          </p:cNvPr>
-          <p:cNvSpPr>
-            <a:spLocks noGrp="1"/>
-          </p:cNvSpPr>
-          <p:nvPr>
-            <p:ph type="title"/>
-          </p:nvPr>
-        </p:nvSpPr>
-        <p:spPr>
-          <a:xfrm>
-            <a:off x="1295400" y="450669"/>
-            <a:ext cx="9601200" cy="816429"/>
-          </a:xfrm>
-        </p:spPr>
-        <p:txBody>
-          <a:bodyPr/>
-          <a:lstStyle/>
-          <a:p>
-            <a:r>
-              <a:rPr lang="en-US" b="1" dirty="0">
-                <a:solidFill>
-                  <a:srgbClr val="FF0000"/>
-                </a:solidFill>
-                <a:latin typeface="Tahoma" panose="020B0604030504040204" pitchFamily="34" charset="0"/>
-                <a:ea typeface="Tahoma" panose="020B0604030504040204" pitchFamily="34" charset="0"/>
-                <a:cs typeface="Tahoma" panose="020B0604030504040204" pitchFamily="34" charset="0"/>
-              </a:rPr>
-              <a:t>Structure:</a:t>
-            </a:r>
-            <a:endParaRPr lang="vi-VN" b="1" dirty="0">
-              <a:solidFill>
-                <a:srgbClr val="FF0000"/>
-              </a:solidFill>
-              <a:latin typeface="Tahoma" panose="020B0604030504040204" pitchFamily="34" charset="0"/>
-              <a:ea typeface="Tahoma" panose="020B0604030504040204" pitchFamily="34" charset="0"/>
-              <a:cs typeface="Tahoma" panose="020B0604030504040204" pitchFamily="34" charset="0"/>
-            </a:endParaRPr>
-          </a:p>
-        </p:txBody>
-      </p:sp>
-      <p:graphicFrame>
-        <p:nvGraphicFramePr>
-          <p:cNvPr id="4" name="Diagram 3">
-            <a:extLst>
-              <a:ext uri="{FF2B5EF4-FFF2-40B4-BE49-F238E27FC236}">
-                <a16:creationId xmlns:a16="http://schemas.microsoft.com/office/drawing/2014/main" id="{67797590-7AEA-4B1B-BA98-2F0D2203915E}"/>
-              </a:ext>
-            </a:extLst>
-          </p:cNvPr>
-          <p:cNvGraphicFramePr/>
-          <p:nvPr>
-            <p:extLst>
-              <p:ext uri="{D42A27DB-BD31-4B8C-83A1-F6EECF244321}">
-                <p14:modId xmlns:p14="http://schemas.microsoft.com/office/powerpoint/2010/main" val="2180006905"/>
-              </p:ext>
-            </p:extLst>
-          </p:nvPr>
-        </p:nvGraphicFramePr>
-        <p:xfrm>
-          <a:off x="2645954" y="1267098"/>
-          <a:ext cx="7765143" cy="4701419"/>
-        </p:xfrm>
-        <a:graphic>
-          <a:graphicData uri="http://schemas.openxmlformats.org/drawingml/2006/diagram">
-            <dgm:relIds xmlns:dgm="http://schemas.openxmlformats.org/drawingml/2006/diagram" xmlns:r="http://schemas.openxmlformats.org/officeDocument/2006/relationships" r:dm="rId2" r:lo="rId3" r:qs="rId4" r:cs="rId5"/>
-          </a:graphicData>
-        </a:graphic>
-      </p:graphicFrame>
-    </p:spTree>
-    <p:extLst>
-      <p:ext uri="{BB962C8B-B14F-4D97-AF65-F5344CB8AC3E}">
-        <p14:creationId xmlns:p14="http://schemas.microsoft.com/office/powerpoint/2010/main" val="1491828072"/>
-      </p:ext>
-    </p:extLst>
-  </p:cSld>
-  <p:clrMapOvr>
-    <a:masterClrMapping/>
-  </p:clrMapOvr>
-</p:sld>
-</file>
-
-<file path=ppt/slides/slide20.xml><?xml version="1.0" encoding="utf-8"?>
-<p:sld xmlns:a="http://schemas.openxmlformats.org/drawingml/2006/main" xmlns:r="http://schemas.openxmlformats.org/officeDocument/2006/relationships" xmlns:p="http://schemas.openxmlformats.org/presentationml/2006/main">
-  <p:cSld>
-    <p:spTree>
-      <p:nvGrpSpPr>
-        <p:cNvPr id="1" name=""/>
-        <p:cNvGrpSpPr/>
-        <p:nvPr/>
-      </p:nvGrpSpPr>
-      <p:grpSpPr>
-        <a:xfrm>
-          <a:off x="0" y="0"/>
-          <a:ext cx="0" cy="0"/>
-          <a:chOff x="0" y="0"/>
-          <a:chExt cx="0" cy="0"/>
-        </a:xfrm>
-      </p:grpSpPr>
-      <p:grpSp>
-        <p:nvGrpSpPr>
-          <p:cNvPr id="4" name="Group 3">
-            <a:extLst>
-              <a:ext uri="{FF2B5EF4-FFF2-40B4-BE49-F238E27FC236}">
-                <a16:creationId xmlns:a16="http://schemas.microsoft.com/office/drawing/2014/main" id="{D944BAA1-C6F8-40D8-9555-818F8267CF7F}"/>
-              </a:ext>
-            </a:extLst>
-          </p:cNvPr>
-          <p:cNvGrpSpPr/>
-          <p:nvPr/>
-        </p:nvGrpSpPr>
-        <p:grpSpPr>
-          <a:xfrm>
-            <a:off x="946331" y="151708"/>
-            <a:ext cx="7765143" cy="911430"/>
-            <a:chOff x="0" y="2405429"/>
-            <a:chExt cx="7765143" cy="911430"/>
-          </a:xfrm>
-        </p:grpSpPr>
-        <p:sp>
-          <p:nvSpPr>
-            <p:cNvPr id="5" name="Rectangle: Rounded Corners 4">
-              <a:extLst>
-                <a:ext uri="{FF2B5EF4-FFF2-40B4-BE49-F238E27FC236}">
-                  <a16:creationId xmlns:a16="http://schemas.microsoft.com/office/drawing/2014/main" id="{61EEB3F5-CF75-42ED-9C45-79AB7C3777BB}"/>
-                </a:ext>
-              </a:extLst>
-            </p:cNvPr>
-            <p:cNvSpPr/>
-            <p:nvPr/>
-          </p:nvSpPr>
-          <p:spPr>
-            <a:xfrm>
-              <a:off x="0" y="2405429"/>
-              <a:ext cx="7765143" cy="911430"/>
-            </a:xfrm>
-            <a:prstGeom prst="roundRect">
-              <a:avLst/>
-            </a:prstGeom>
-          </p:spPr>
-          <p:style>
-            <a:lnRef idx="0">
-              <a:schemeClr val="lt1">
-                <a:hueOff val="0"/>
-                <a:satOff val="0"/>
-                <a:lumOff val="0"/>
-                <a:alphaOff val="0"/>
-              </a:schemeClr>
-            </a:lnRef>
-            <a:fillRef idx="3">
-              <a:schemeClr val="accent4">
-                <a:hueOff val="0"/>
-                <a:satOff val="0"/>
-                <a:lumOff val="0"/>
-                <a:alphaOff val="0"/>
-              </a:schemeClr>
-            </a:fillRef>
-            <a:effectRef idx="2">
-              <a:schemeClr val="accent4">
-                <a:hueOff val="0"/>
-                <a:satOff val="0"/>
-                <a:lumOff val="0"/>
-                <a:alphaOff val="0"/>
-              </a:schemeClr>
-            </a:effectRef>
-            <a:fontRef idx="minor">
-              <a:schemeClr val="lt1"/>
-            </a:fontRef>
-          </p:style>
-        </p:sp>
-        <p:sp>
-          <p:nvSpPr>
-            <p:cNvPr id="6" name="Rectangle: Rounded Corners 4">
-              <a:extLst>
-                <a:ext uri="{FF2B5EF4-FFF2-40B4-BE49-F238E27FC236}">
-                  <a16:creationId xmlns:a16="http://schemas.microsoft.com/office/drawing/2014/main" id="{A6AE1549-2AE4-40DE-AF1C-EF8CD8CD4C27}"/>
-                </a:ext>
-              </a:extLst>
-            </p:cNvPr>
-            <p:cNvSpPr txBox="1"/>
-            <p:nvPr/>
-          </p:nvSpPr>
-          <p:spPr>
-            <a:xfrm>
-              <a:off x="44492" y="2449921"/>
-              <a:ext cx="7676159" cy="822446"/>
-            </a:xfrm>
-            <a:prstGeom prst="rect">
-              <a:avLst/>
-            </a:prstGeom>
-          </p:spPr>
-          <p:style>
-            <a:lnRef idx="0">
-              <a:scrgbClr r="0" g="0" b="0"/>
-            </a:lnRef>
-            <a:fillRef idx="0">
-              <a:scrgbClr r="0" g="0" b="0"/>
-            </a:fillRef>
-            <a:effectRef idx="0">
-              <a:scrgbClr r="0" g="0" b="0"/>
-            </a:effectRef>
-            <a:fontRef idx="minor">
-              <a:schemeClr val="lt1"/>
-            </a:fontRef>
-          </p:style>
-          <p:txBody>
-            <a:bodyPr spcFirstLastPara="0" vert="horz" wrap="square" lIns="144780" tIns="144780" rIns="144780" bIns="144780" numCol="1" spcCol="1270" anchor="ctr" anchorCtr="0">
-              <a:noAutofit/>
-            </a:bodyPr>
-            <a:lstStyle/>
-            <a:p>
-              <a:pPr marL="0" lvl="0" indent="0" algn="l" defTabSz="1689100">
-                <a:lnSpc>
-                  <a:spcPct val="90000"/>
-                </a:lnSpc>
-                <a:spcBef>
-                  <a:spcPct val="0"/>
-                </a:spcBef>
-                <a:spcAft>
-                  <a:spcPct val="35000"/>
-                </a:spcAft>
-                <a:buNone/>
-              </a:pPr>
-              <a:r>
-                <a:rPr lang="en-US" sz="3800" b="1" kern="1200">
-                  <a:latin typeface="Tahoma" panose="020B0604030504040204" pitchFamily="34" charset="0"/>
-                  <a:ea typeface="Tahoma" panose="020B0604030504040204" pitchFamily="34" charset="0"/>
-                  <a:cs typeface="Tahoma" panose="020B0604030504040204" pitchFamily="34" charset="0"/>
-                </a:rPr>
-                <a:t>Demo Point of Sale</a:t>
-              </a:r>
-              <a:endParaRPr lang="vi-VN" sz="3800" b="1" kern="1200" dirty="0">
-                <a:latin typeface="Tahoma" panose="020B0604030504040204" pitchFamily="34" charset="0"/>
-                <a:ea typeface="Tahoma" panose="020B0604030504040204" pitchFamily="34" charset="0"/>
-                <a:cs typeface="Tahoma" panose="020B0604030504040204" pitchFamily="34" charset="0"/>
-              </a:endParaRPr>
-            </a:p>
-          </p:txBody>
-        </p:sp>
-      </p:grpSp>
-      <p:sp>
-        <p:nvSpPr>
-          <p:cNvPr id="10" name="Rectangle 9">
-            <a:extLst>
-              <a:ext uri="{FF2B5EF4-FFF2-40B4-BE49-F238E27FC236}">
-                <a16:creationId xmlns:a16="http://schemas.microsoft.com/office/drawing/2014/main" id="{DA13A663-A660-4142-A601-35F4AB3CB6CB}"/>
-              </a:ext>
-            </a:extLst>
-          </p:cNvPr>
-          <p:cNvSpPr/>
-          <p:nvPr/>
-        </p:nvSpPr>
-        <p:spPr>
-          <a:xfrm>
-            <a:off x="1535456" y="1119427"/>
-            <a:ext cx="444352" cy="707886"/>
-          </a:xfrm>
-          <a:prstGeom prst="rect">
-            <a:avLst/>
-          </a:prstGeom>
-        </p:spPr>
-        <p:txBody>
-          <a:bodyPr wrap="none">
-            <a:spAutoFit/>
-          </a:bodyPr>
-          <a:lstStyle/>
-          <a:p>
-            <a:r>
-              <a:rPr lang="vi-VN" sz="4000" b="1" dirty="0">
-                <a:solidFill>
-                  <a:srgbClr val="21313A"/>
-                </a:solidFill>
-                <a:latin typeface="Work Sans"/>
-              </a:rPr>
-              <a:t>1</a:t>
-            </a:r>
-            <a:endParaRPr lang="vi-VN" sz="4000" b="1" i="0" dirty="0">
-              <a:solidFill>
-                <a:srgbClr val="21313A"/>
-              </a:solidFill>
-              <a:effectLst/>
-              <a:latin typeface="Work Sans"/>
-            </a:endParaRPr>
-          </a:p>
-        </p:txBody>
-      </p:sp>
-    </p:spTree>
-    <p:extLst>
-      <p:ext uri="{BB962C8B-B14F-4D97-AF65-F5344CB8AC3E}">
-        <p14:creationId xmlns:p14="http://schemas.microsoft.com/office/powerpoint/2010/main" val="2995654141"/>
-      </p:ext>
-    </p:extLst>
-  </p:cSld>
-  <p:clrMapOvr>
-    <a:masterClrMapping/>
-  </p:clrMapOvr>
-</p:sld>
-</file>
-
-<file path=ppt/slides/slide21.xml><?xml version="1.0" encoding="utf-8"?>
-<p:sld xmlns:a="http://schemas.openxmlformats.org/drawingml/2006/main" xmlns:r="http://schemas.openxmlformats.org/officeDocument/2006/relationships" xmlns:p="http://schemas.openxmlformats.org/presentationml/2006/main">
-  <p:cSld>
-    <p:spTree>
-      <p:nvGrpSpPr>
-        <p:cNvPr id="1" name=""/>
-        <p:cNvGrpSpPr/>
-        <p:nvPr/>
-      </p:nvGrpSpPr>
-      <p:grpSpPr>
-        <a:xfrm>
-          <a:off x="0" y="0"/>
-          <a:ext cx="0" cy="0"/>
-          <a:chOff x="0" y="0"/>
-          <a:chExt cx="0" cy="0"/>
-        </a:xfrm>
-      </p:grpSpPr>
-      <p:grpSp>
-        <p:nvGrpSpPr>
-          <p:cNvPr id="4" name="Group 3">
-            <a:extLst>
-              <a:ext uri="{FF2B5EF4-FFF2-40B4-BE49-F238E27FC236}">
-                <a16:creationId xmlns:a16="http://schemas.microsoft.com/office/drawing/2014/main" id="{D944BAA1-C6F8-40D8-9555-818F8267CF7F}"/>
-              </a:ext>
-            </a:extLst>
-          </p:cNvPr>
-          <p:cNvGrpSpPr/>
-          <p:nvPr/>
-        </p:nvGrpSpPr>
-        <p:grpSpPr>
-          <a:xfrm>
-            <a:off x="946331" y="151708"/>
-            <a:ext cx="7765143" cy="911430"/>
-            <a:chOff x="0" y="2405429"/>
-            <a:chExt cx="7765143" cy="911430"/>
-          </a:xfrm>
-        </p:grpSpPr>
-        <p:sp>
-          <p:nvSpPr>
-            <p:cNvPr id="5" name="Rectangle: Rounded Corners 4">
-              <a:extLst>
-                <a:ext uri="{FF2B5EF4-FFF2-40B4-BE49-F238E27FC236}">
-                  <a16:creationId xmlns:a16="http://schemas.microsoft.com/office/drawing/2014/main" id="{61EEB3F5-CF75-42ED-9C45-79AB7C3777BB}"/>
-                </a:ext>
-              </a:extLst>
-            </p:cNvPr>
-            <p:cNvSpPr/>
-            <p:nvPr/>
-          </p:nvSpPr>
-          <p:spPr>
-            <a:xfrm>
-              <a:off x="0" y="2405429"/>
-              <a:ext cx="7765143" cy="911430"/>
-            </a:xfrm>
-            <a:prstGeom prst="roundRect">
-              <a:avLst/>
-            </a:prstGeom>
-          </p:spPr>
-          <p:style>
-            <a:lnRef idx="0">
-              <a:schemeClr val="lt1">
-                <a:hueOff val="0"/>
-                <a:satOff val="0"/>
-                <a:lumOff val="0"/>
-                <a:alphaOff val="0"/>
-              </a:schemeClr>
-            </a:lnRef>
-            <a:fillRef idx="3">
-              <a:schemeClr val="accent4">
-                <a:hueOff val="0"/>
-                <a:satOff val="0"/>
-                <a:lumOff val="0"/>
-                <a:alphaOff val="0"/>
-              </a:schemeClr>
-            </a:fillRef>
-            <a:effectRef idx="2">
-              <a:schemeClr val="accent4">
-                <a:hueOff val="0"/>
-                <a:satOff val="0"/>
-                <a:lumOff val="0"/>
-                <a:alphaOff val="0"/>
-              </a:schemeClr>
-            </a:effectRef>
-            <a:fontRef idx="minor">
-              <a:schemeClr val="lt1"/>
-            </a:fontRef>
-          </p:style>
-        </p:sp>
-        <p:sp>
-          <p:nvSpPr>
-            <p:cNvPr id="6" name="Rectangle: Rounded Corners 4">
-              <a:extLst>
-                <a:ext uri="{FF2B5EF4-FFF2-40B4-BE49-F238E27FC236}">
-                  <a16:creationId xmlns:a16="http://schemas.microsoft.com/office/drawing/2014/main" id="{A6AE1549-2AE4-40DE-AF1C-EF8CD8CD4C27}"/>
-                </a:ext>
-              </a:extLst>
-            </p:cNvPr>
-            <p:cNvSpPr txBox="1"/>
-            <p:nvPr/>
-          </p:nvSpPr>
-          <p:spPr>
-            <a:xfrm>
-              <a:off x="44492" y="2449921"/>
-              <a:ext cx="7676159" cy="822446"/>
-            </a:xfrm>
-            <a:prstGeom prst="rect">
-              <a:avLst/>
-            </a:prstGeom>
-          </p:spPr>
-          <p:style>
-            <a:lnRef idx="0">
-              <a:scrgbClr r="0" g="0" b="0"/>
-            </a:lnRef>
-            <a:fillRef idx="0">
-              <a:scrgbClr r="0" g="0" b="0"/>
-            </a:fillRef>
-            <a:effectRef idx="0">
-              <a:scrgbClr r="0" g="0" b="0"/>
-            </a:effectRef>
-            <a:fontRef idx="minor">
-              <a:schemeClr val="lt1"/>
-            </a:fontRef>
-          </p:style>
-          <p:txBody>
-            <a:bodyPr spcFirstLastPara="0" vert="horz" wrap="square" lIns="144780" tIns="144780" rIns="144780" bIns="144780" numCol="1" spcCol="1270" anchor="ctr" anchorCtr="0">
-              <a:noAutofit/>
-            </a:bodyPr>
-            <a:lstStyle/>
-            <a:p>
-              <a:pPr marL="0" lvl="0" indent="0" algn="l" defTabSz="1689100">
-                <a:lnSpc>
-                  <a:spcPct val="90000"/>
-                </a:lnSpc>
-                <a:spcBef>
-                  <a:spcPct val="0"/>
-                </a:spcBef>
-                <a:spcAft>
-                  <a:spcPct val="35000"/>
-                </a:spcAft>
-                <a:buNone/>
-              </a:pPr>
-              <a:r>
-                <a:rPr lang="en-US" sz="3800" b="1" kern="1200">
-                  <a:latin typeface="Tahoma" panose="020B0604030504040204" pitchFamily="34" charset="0"/>
-                  <a:ea typeface="Tahoma" panose="020B0604030504040204" pitchFamily="34" charset="0"/>
-                  <a:cs typeface="Tahoma" panose="020B0604030504040204" pitchFamily="34" charset="0"/>
-                </a:rPr>
-                <a:t>Demo Point of Sale</a:t>
-              </a:r>
-              <a:endParaRPr lang="vi-VN" sz="3800" b="1" kern="1200" dirty="0">
-                <a:latin typeface="Tahoma" panose="020B0604030504040204" pitchFamily="34" charset="0"/>
-                <a:ea typeface="Tahoma" panose="020B0604030504040204" pitchFamily="34" charset="0"/>
-                <a:cs typeface="Tahoma" panose="020B0604030504040204" pitchFamily="34" charset="0"/>
-              </a:endParaRPr>
-            </a:p>
-          </p:txBody>
-        </p:sp>
-      </p:grpSp>
-      <p:sp>
-        <p:nvSpPr>
-          <p:cNvPr id="10" name="Rectangle 9">
-            <a:extLst>
-              <a:ext uri="{FF2B5EF4-FFF2-40B4-BE49-F238E27FC236}">
-                <a16:creationId xmlns:a16="http://schemas.microsoft.com/office/drawing/2014/main" id="{DA13A663-A660-4142-A601-35F4AB3CB6CB}"/>
-              </a:ext>
-            </a:extLst>
-          </p:cNvPr>
-          <p:cNvSpPr/>
-          <p:nvPr/>
-        </p:nvSpPr>
-        <p:spPr>
-          <a:xfrm>
-            <a:off x="1535456" y="1119427"/>
-            <a:ext cx="444352" cy="707886"/>
-          </a:xfrm>
-          <a:prstGeom prst="rect">
-            <a:avLst/>
-          </a:prstGeom>
-        </p:spPr>
-        <p:txBody>
-          <a:bodyPr wrap="none">
-            <a:spAutoFit/>
-          </a:bodyPr>
-          <a:lstStyle/>
-          <a:p>
-            <a:r>
-              <a:rPr lang="vi-VN" sz="4000" b="1" dirty="0">
-                <a:solidFill>
-                  <a:srgbClr val="21313A"/>
-                </a:solidFill>
-                <a:latin typeface="Work Sans"/>
-              </a:rPr>
-              <a:t>1</a:t>
-            </a:r>
-            <a:endParaRPr lang="vi-VN" sz="4000" b="1" i="0" dirty="0">
-              <a:solidFill>
-                <a:srgbClr val="21313A"/>
-              </a:solidFill>
-              <a:effectLst/>
-              <a:latin typeface="Work Sans"/>
-            </a:endParaRPr>
-          </a:p>
-        </p:txBody>
-      </p:sp>
-    </p:spTree>
-    <p:extLst>
-      <p:ext uri="{BB962C8B-B14F-4D97-AF65-F5344CB8AC3E}">
-        <p14:creationId xmlns:p14="http://schemas.microsoft.com/office/powerpoint/2010/main" val="2799481474"/>
-      </p:ext>
-    </p:extLst>
-  </p:cSld>
-  <p:clrMapOvr>
-    <a:masterClrMapping/>
-  </p:clrMapOvr>
-</p:sld>
-</file>
-
-<file path=ppt/slides/slide22.xml><?xml version="1.0" encoding="utf-8"?>
-<p:sld xmlns:a="http://schemas.openxmlformats.org/drawingml/2006/main" xmlns:r="http://schemas.openxmlformats.org/officeDocument/2006/relationships" xmlns:p="http://schemas.openxmlformats.org/presentationml/2006/main">
-  <p:cSld>
-    <p:spTree>
-      <p:nvGrpSpPr>
-        <p:cNvPr id="1" name=""/>
-        <p:cNvGrpSpPr/>
-        <p:nvPr/>
-      </p:nvGrpSpPr>
-      <p:grpSpPr>
-        <a:xfrm>
-          <a:off x="0" y="0"/>
-          <a:ext cx="0" cy="0"/>
-          <a:chOff x="0" y="0"/>
-          <a:chExt cx="0" cy="0"/>
-        </a:xfrm>
-      </p:grpSpPr>
-      <p:grpSp>
-        <p:nvGrpSpPr>
-          <p:cNvPr id="4" name="Group 3">
-            <a:extLst>
-              <a:ext uri="{FF2B5EF4-FFF2-40B4-BE49-F238E27FC236}">
-                <a16:creationId xmlns:a16="http://schemas.microsoft.com/office/drawing/2014/main" id="{D944BAA1-C6F8-40D8-9555-818F8267CF7F}"/>
-              </a:ext>
-            </a:extLst>
-          </p:cNvPr>
-          <p:cNvGrpSpPr/>
-          <p:nvPr/>
-        </p:nvGrpSpPr>
-        <p:grpSpPr>
-          <a:xfrm>
-            <a:off x="946331" y="151708"/>
-            <a:ext cx="7765143" cy="911430"/>
-            <a:chOff x="0" y="2405429"/>
-            <a:chExt cx="7765143" cy="911430"/>
-          </a:xfrm>
-        </p:grpSpPr>
-        <p:sp>
-          <p:nvSpPr>
-            <p:cNvPr id="5" name="Rectangle: Rounded Corners 4">
-              <a:extLst>
-                <a:ext uri="{FF2B5EF4-FFF2-40B4-BE49-F238E27FC236}">
-                  <a16:creationId xmlns:a16="http://schemas.microsoft.com/office/drawing/2014/main" id="{61EEB3F5-CF75-42ED-9C45-79AB7C3777BB}"/>
-                </a:ext>
-              </a:extLst>
-            </p:cNvPr>
-            <p:cNvSpPr/>
-            <p:nvPr/>
-          </p:nvSpPr>
-          <p:spPr>
-            <a:xfrm>
-              <a:off x="0" y="2405429"/>
-              <a:ext cx="7765143" cy="911430"/>
-            </a:xfrm>
-            <a:prstGeom prst="roundRect">
-              <a:avLst/>
-            </a:prstGeom>
-          </p:spPr>
-          <p:style>
-            <a:lnRef idx="0">
-              <a:schemeClr val="lt1">
-                <a:hueOff val="0"/>
-                <a:satOff val="0"/>
-                <a:lumOff val="0"/>
-                <a:alphaOff val="0"/>
-              </a:schemeClr>
-            </a:lnRef>
-            <a:fillRef idx="3">
-              <a:schemeClr val="accent4">
-                <a:hueOff val="0"/>
-                <a:satOff val="0"/>
-                <a:lumOff val="0"/>
-                <a:alphaOff val="0"/>
-              </a:schemeClr>
-            </a:fillRef>
-            <a:effectRef idx="2">
-              <a:schemeClr val="accent4">
-                <a:hueOff val="0"/>
-                <a:satOff val="0"/>
-                <a:lumOff val="0"/>
-                <a:alphaOff val="0"/>
-              </a:schemeClr>
-            </a:effectRef>
-            <a:fontRef idx="minor">
-              <a:schemeClr val="lt1"/>
-            </a:fontRef>
-          </p:style>
-        </p:sp>
-        <p:sp>
-          <p:nvSpPr>
-            <p:cNvPr id="6" name="Rectangle: Rounded Corners 4">
-              <a:extLst>
-                <a:ext uri="{FF2B5EF4-FFF2-40B4-BE49-F238E27FC236}">
-                  <a16:creationId xmlns:a16="http://schemas.microsoft.com/office/drawing/2014/main" id="{A6AE1549-2AE4-40DE-AF1C-EF8CD8CD4C27}"/>
-                </a:ext>
-              </a:extLst>
-            </p:cNvPr>
-            <p:cNvSpPr txBox="1"/>
-            <p:nvPr/>
-          </p:nvSpPr>
-          <p:spPr>
-            <a:xfrm>
-              <a:off x="44492" y="2449921"/>
-              <a:ext cx="7676159" cy="822446"/>
-            </a:xfrm>
-            <a:prstGeom prst="rect">
-              <a:avLst/>
-            </a:prstGeom>
-          </p:spPr>
-          <p:style>
-            <a:lnRef idx="0">
-              <a:scrgbClr r="0" g="0" b="0"/>
-            </a:lnRef>
-            <a:fillRef idx="0">
-              <a:scrgbClr r="0" g="0" b="0"/>
-            </a:fillRef>
-            <a:effectRef idx="0">
-              <a:scrgbClr r="0" g="0" b="0"/>
-            </a:effectRef>
-            <a:fontRef idx="minor">
-              <a:schemeClr val="lt1"/>
-            </a:fontRef>
-          </p:style>
-          <p:txBody>
-            <a:bodyPr spcFirstLastPara="0" vert="horz" wrap="square" lIns="144780" tIns="144780" rIns="144780" bIns="144780" numCol="1" spcCol="1270" anchor="ctr" anchorCtr="0">
-              <a:noAutofit/>
-            </a:bodyPr>
-            <a:lstStyle/>
-            <a:p>
-              <a:pPr marL="0" lvl="0" indent="0" algn="l" defTabSz="1689100">
-                <a:lnSpc>
-                  <a:spcPct val="90000"/>
-                </a:lnSpc>
-                <a:spcBef>
-                  <a:spcPct val="0"/>
-                </a:spcBef>
-                <a:spcAft>
-                  <a:spcPct val="35000"/>
-                </a:spcAft>
-                <a:buNone/>
-              </a:pPr>
-              <a:r>
-                <a:rPr lang="en-US" sz="3800" b="1" kern="1200">
-                  <a:latin typeface="Tahoma" panose="020B0604030504040204" pitchFamily="34" charset="0"/>
-                  <a:ea typeface="Tahoma" panose="020B0604030504040204" pitchFamily="34" charset="0"/>
-                  <a:cs typeface="Tahoma" panose="020B0604030504040204" pitchFamily="34" charset="0"/>
-                </a:rPr>
-                <a:t>Demo Point of Sale</a:t>
-              </a:r>
-              <a:endParaRPr lang="vi-VN" sz="3800" b="1" kern="1200" dirty="0">
-                <a:latin typeface="Tahoma" panose="020B0604030504040204" pitchFamily="34" charset="0"/>
-                <a:ea typeface="Tahoma" panose="020B0604030504040204" pitchFamily="34" charset="0"/>
-                <a:cs typeface="Tahoma" panose="020B0604030504040204" pitchFamily="34" charset="0"/>
-              </a:endParaRPr>
-            </a:p>
-          </p:txBody>
-        </p:sp>
-      </p:grpSp>
-      <p:sp>
-        <p:nvSpPr>
-          <p:cNvPr id="10" name="Rectangle 9">
-            <a:extLst>
-              <a:ext uri="{FF2B5EF4-FFF2-40B4-BE49-F238E27FC236}">
-                <a16:creationId xmlns:a16="http://schemas.microsoft.com/office/drawing/2014/main" id="{DA13A663-A660-4142-A601-35F4AB3CB6CB}"/>
-              </a:ext>
-            </a:extLst>
-          </p:cNvPr>
-          <p:cNvSpPr/>
-          <p:nvPr/>
-        </p:nvSpPr>
-        <p:spPr>
-          <a:xfrm>
-            <a:off x="1535456" y="1119427"/>
-            <a:ext cx="444352" cy="707886"/>
-          </a:xfrm>
-          <a:prstGeom prst="rect">
-            <a:avLst/>
-          </a:prstGeom>
-        </p:spPr>
-        <p:txBody>
-          <a:bodyPr wrap="none">
-            <a:spAutoFit/>
-          </a:bodyPr>
-          <a:lstStyle/>
-          <a:p>
-            <a:r>
-              <a:rPr lang="vi-VN" sz="4000" b="1" dirty="0">
-                <a:solidFill>
-                  <a:srgbClr val="21313A"/>
-                </a:solidFill>
-                <a:latin typeface="Work Sans"/>
-              </a:rPr>
-              <a:t>1</a:t>
-            </a:r>
-            <a:endParaRPr lang="vi-VN" sz="4000" b="1" i="0" dirty="0">
-              <a:solidFill>
-                <a:srgbClr val="21313A"/>
-              </a:solidFill>
-              <a:effectLst/>
-              <a:latin typeface="Work Sans"/>
-            </a:endParaRPr>
-          </a:p>
-        </p:txBody>
-      </p:sp>
-    </p:spTree>
-    <p:extLst>
-      <p:ext uri="{BB962C8B-B14F-4D97-AF65-F5344CB8AC3E}">
-        <p14:creationId xmlns:p14="http://schemas.microsoft.com/office/powerpoint/2010/main" val="1033527743"/>
-      </p:ext>
-    </p:extLst>
-  </p:cSld>
-  <p:clrMapOvr>
-    <a:masterClrMapping/>
-  </p:clrMapOvr>
-</p:sld>
-</file>
-
-<file path=ppt/slides/slide23.xml><?xml version="1.0" encoding="utf-8"?>
-<p:sld xmlns:a="http://schemas.openxmlformats.org/drawingml/2006/main" xmlns:r="http://schemas.openxmlformats.org/officeDocument/2006/relationships" xmlns:p="http://schemas.openxmlformats.org/presentationml/2006/main">
-  <p:cSld>
-    <p:spTree>
-      <p:nvGrpSpPr>
-        <p:cNvPr id="1" name=""/>
-        <p:cNvGrpSpPr/>
-        <p:nvPr/>
-      </p:nvGrpSpPr>
-      <p:grpSpPr>
-        <a:xfrm>
-          <a:off x="0" y="0"/>
-          <a:ext cx="0" cy="0"/>
-          <a:chOff x="0" y="0"/>
-          <a:chExt cx="0" cy="0"/>
-        </a:xfrm>
-      </p:grpSpPr>
-      <p:grpSp>
-        <p:nvGrpSpPr>
-          <p:cNvPr id="4" name="Group 3">
-            <a:extLst>
-              <a:ext uri="{FF2B5EF4-FFF2-40B4-BE49-F238E27FC236}">
-                <a16:creationId xmlns:a16="http://schemas.microsoft.com/office/drawing/2014/main" id="{D944BAA1-C6F8-40D8-9555-818F8267CF7F}"/>
-              </a:ext>
-            </a:extLst>
-          </p:cNvPr>
-          <p:cNvGrpSpPr/>
-          <p:nvPr/>
-        </p:nvGrpSpPr>
-        <p:grpSpPr>
-          <a:xfrm>
-            <a:off x="946331" y="151708"/>
-            <a:ext cx="7765143" cy="911430"/>
-            <a:chOff x="0" y="2405429"/>
-            <a:chExt cx="7765143" cy="911430"/>
-          </a:xfrm>
-        </p:grpSpPr>
-        <p:sp>
-          <p:nvSpPr>
-            <p:cNvPr id="5" name="Rectangle: Rounded Corners 4">
-              <a:extLst>
-                <a:ext uri="{FF2B5EF4-FFF2-40B4-BE49-F238E27FC236}">
-                  <a16:creationId xmlns:a16="http://schemas.microsoft.com/office/drawing/2014/main" id="{61EEB3F5-CF75-42ED-9C45-79AB7C3777BB}"/>
-                </a:ext>
-              </a:extLst>
-            </p:cNvPr>
-            <p:cNvSpPr/>
-            <p:nvPr/>
-          </p:nvSpPr>
-          <p:spPr>
-            <a:xfrm>
-              <a:off x="0" y="2405429"/>
-              <a:ext cx="7765143" cy="911430"/>
-            </a:xfrm>
-            <a:prstGeom prst="roundRect">
-              <a:avLst/>
-            </a:prstGeom>
-          </p:spPr>
-          <p:style>
-            <a:lnRef idx="0">
-              <a:schemeClr val="lt1">
-                <a:hueOff val="0"/>
-                <a:satOff val="0"/>
-                <a:lumOff val="0"/>
-                <a:alphaOff val="0"/>
-              </a:schemeClr>
-            </a:lnRef>
-            <a:fillRef idx="3">
-              <a:schemeClr val="accent4">
-                <a:hueOff val="0"/>
-                <a:satOff val="0"/>
-                <a:lumOff val="0"/>
-                <a:alphaOff val="0"/>
-              </a:schemeClr>
-            </a:fillRef>
-            <a:effectRef idx="2">
-              <a:schemeClr val="accent4">
-                <a:hueOff val="0"/>
-                <a:satOff val="0"/>
-                <a:lumOff val="0"/>
-                <a:alphaOff val="0"/>
-              </a:schemeClr>
-            </a:effectRef>
-            <a:fontRef idx="minor">
-              <a:schemeClr val="lt1"/>
-            </a:fontRef>
-          </p:style>
-        </p:sp>
-        <p:sp>
-          <p:nvSpPr>
-            <p:cNvPr id="6" name="Rectangle: Rounded Corners 4">
-              <a:extLst>
-                <a:ext uri="{FF2B5EF4-FFF2-40B4-BE49-F238E27FC236}">
-                  <a16:creationId xmlns:a16="http://schemas.microsoft.com/office/drawing/2014/main" id="{A6AE1549-2AE4-40DE-AF1C-EF8CD8CD4C27}"/>
-                </a:ext>
-              </a:extLst>
-            </p:cNvPr>
-            <p:cNvSpPr txBox="1"/>
-            <p:nvPr/>
-          </p:nvSpPr>
-          <p:spPr>
-            <a:xfrm>
-              <a:off x="44492" y="2449921"/>
-              <a:ext cx="7676159" cy="822446"/>
-            </a:xfrm>
-            <a:prstGeom prst="rect">
-              <a:avLst/>
-            </a:prstGeom>
-          </p:spPr>
-          <p:style>
-            <a:lnRef idx="0">
-              <a:scrgbClr r="0" g="0" b="0"/>
-            </a:lnRef>
-            <a:fillRef idx="0">
-              <a:scrgbClr r="0" g="0" b="0"/>
-            </a:fillRef>
-            <a:effectRef idx="0">
-              <a:scrgbClr r="0" g="0" b="0"/>
-            </a:effectRef>
-            <a:fontRef idx="minor">
-              <a:schemeClr val="lt1"/>
-            </a:fontRef>
-          </p:style>
-          <p:txBody>
-            <a:bodyPr spcFirstLastPara="0" vert="horz" wrap="square" lIns="144780" tIns="144780" rIns="144780" bIns="144780" numCol="1" spcCol="1270" anchor="ctr" anchorCtr="0">
-              <a:noAutofit/>
-            </a:bodyPr>
-            <a:lstStyle/>
-            <a:p>
-              <a:pPr marL="0" lvl="0" indent="0" algn="l" defTabSz="1689100">
-                <a:lnSpc>
-                  <a:spcPct val="90000"/>
-                </a:lnSpc>
-                <a:spcBef>
-                  <a:spcPct val="0"/>
-                </a:spcBef>
-                <a:spcAft>
-                  <a:spcPct val="35000"/>
-                </a:spcAft>
-                <a:buNone/>
-              </a:pPr>
-              <a:r>
-                <a:rPr lang="en-US" sz="3800" b="1" kern="1200">
-                  <a:latin typeface="Tahoma" panose="020B0604030504040204" pitchFamily="34" charset="0"/>
-                  <a:ea typeface="Tahoma" panose="020B0604030504040204" pitchFamily="34" charset="0"/>
-                  <a:cs typeface="Tahoma" panose="020B0604030504040204" pitchFamily="34" charset="0"/>
-                </a:rPr>
-                <a:t>Demo Point of Sale</a:t>
-              </a:r>
-              <a:endParaRPr lang="vi-VN" sz="3800" b="1" kern="1200" dirty="0">
-                <a:latin typeface="Tahoma" panose="020B0604030504040204" pitchFamily="34" charset="0"/>
-                <a:ea typeface="Tahoma" panose="020B0604030504040204" pitchFamily="34" charset="0"/>
-                <a:cs typeface="Tahoma" panose="020B0604030504040204" pitchFamily="34" charset="0"/>
-              </a:endParaRPr>
-            </a:p>
-          </p:txBody>
-        </p:sp>
-      </p:grpSp>
-      <p:sp>
-        <p:nvSpPr>
-          <p:cNvPr id="10" name="Rectangle 9">
-            <a:extLst>
-              <a:ext uri="{FF2B5EF4-FFF2-40B4-BE49-F238E27FC236}">
-                <a16:creationId xmlns:a16="http://schemas.microsoft.com/office/drawing/2014/main" id="{DA13A663-A660-4142-A601-35F4AB3CB6CB}"/>
-              </a:ext>
-            </a:extLst>
-          </p:cNvPr>
-          <p:cNvSpPr/>
-          <p:nvPr/>
-        </p:nvSpPr>
-        <p:spPr>
-          <a:xfrm>
-            <a:off x="1535456" y="1119427"/>
-            <a:ext cx="444352" cy="707886"/>
-          </a:xfrm>
-          <a:prstGeom prst="rect">
-            <a:avLst/>
-          </a:prstGeom>
-        </p:spPr>
-        <p:txBody>
-          <a:bodyPr wrap="none">
-            <a:spAutoFit/>
-          </a:bodyPr>
-          <a:lstStyle/>
-          <a:p>
-            <a:r>
-              <a:rPr lang="vi-VN" sz="4000" b="1" dirty="0">
-                <a:solidFill>
-                  <a:srgbClr val="21313A"/>
-                </a:solidFill>
-                <a:latin typeface="Work Sans"/>
-              </a:rPr>
-              <a:t>1</a:t>
-            </a:r>
-            <a:endParaRPr lang="vi-VN" sz="4000" b="1" i="0" dirty="0">
-              <a:solidFill>
-                <a:srgbClr val="21313A"/>
-              </a:solidFill>
-              <a:effectLst/>
-              <a:latin typeface="Work Sans"/>
-            </a:endParaRPr>
-          </a:p>
-        </p:txBody>
-      </p:sp>
-    </p:spTree>
-    <p:extLst>
-      <p:ext uri="{BB962C8B-B14F-4D97-AF65-F5344CB8AC3E}">
-        <p14:creationId xmlns:p14="http://schemas.microsoft.com/office/powerpoint/2010/main" val="2038507019"/>
-      </p:ext>
-    </p:extLst>
-  </p:cSld>
-  <p:clrMapOvr>
-    <a:masterClrMapping/>
-  </p:clrMapOvr>
-</p:sld>
-</file>
-
-<file path=ppt/slides/slide24.xml><?xml version="1.0" encoding="utf-8"?>
-<p:sld xmlns:a="http://schemas.openxmlformats.org/drawingml/2006/main" xmlns:r="http://schemas.openxmlformats.org/officeDocument/2006/relationships" xmlns:p="http://schemas.openxmlformats.org/presentationml/2006/main">
-  <p:cSld>
-    <p:spTree>
-      <p:nvGrpSpPr>
-        <p:cNvPr id="1" name=""/>
-        <p:cNvGrpSpPr/>
-        <p:nvPr/>
-      </p:nvGrpSpPr>
-      <p:grpSpPr>
-        <a:xfrm>
-          <a:off x="0" y="0"/>
-          <a:ext cx="0" cy="0"/>
-          <a:chOff x="0" y="0"/>
-          <a:chExt cx="0" cy="0"/>
-        </a:xfrm>
-      </p:grpSpPr>
-      <p:sp>
-        <p:nvSpPr>
-          <p:cNvPr id="2" name="Title 1">
-            <a:extLst>
-              <a:ext uri="{FF2B5EF4-FFF2-40B4-BE49-F238E27FC236}">
-                <a16:creationId xmlns:a16="http://schemas.microsoft.com/office/drawing/2014/main" id="{27126FC6-C552-4BBC-99BD-3BDB25A9E17F}"/>
-              </a:ext>
-            </a:extLst>
-          </p:cNvPr>
-          <p:cNvSpPr>
-            <a:spLocks noGrp="1"/>
-          </p:cNvSpPr>
-          <p:nvPr>
-            <p:ph type="title"/>
-          </p:nvPr>
-        </p:nvSpPr>
-        <p:spPr/>
-        <p:txBody>
-          <a:bodyPr/>
-          <a:lstStyle/>
-          <a:p>
-            <a:endParaRPr lang="vi-VN"/>
-          </a:p>
-        </p:txBody>
-      </p:sp>
-      <p:sp>
-        <p:nvSpPr>
-          <p:cNvPr id="3" name="Content Placeholder 2">
-            <a:extLst>
-              <a:ext uri="{FF2B5EF4-FFF2-40B4-BE49-F238E27FC236}">
-                <a16:creationId xmlns:a16="http://schemas.microsoft.com/office/drawing/2014/main" id="{EC6BA825-C280-4998-B374-EE09211868C5}"/>
-              </a:ext>
-            </a:extLst>
-          </p:cNvPr>
-          <p:cNvSpPr>
-            <a:spLocks noGrp="1"/>
-          </p:cNvSpPr>
-          <p:nvPr>
-            <p:ph idx="1"/>
-          </p:nvPr>
-        </p:nvSpPr>
-        <p:spPr/>
-        <p:txBody>
-          <a:bodyPr/>
-          <a:lstStyle/>
-          <a:p>
-            <a:endParaRPr lang="vi-VN"/>
-          </a:p>
-        </p:txBody>
-      </p:sp>
-    </p:spTree>
-    <p:extLst>
-      <p:ext uri="{BB962C8B-B14F-4D97-AF65-F5344CB8AC3E}">
-        <p14:creationId xmlns:p14="http://schemas.microsoft.com/office/powerpoint/2010/main" val="2870217465"/>
-      </p:ext>
-    </p:extLst>
-  </p:cSld>
-  <p:clrMapOvr>
-    <a:masterClrMapping/>
-  </p:clrMapOvr>
-</p:sld>
-</file>
-
-<file path=ppt/slides/slide25.xml><?xml version="1.0" encoding="utf-8"?>
-<p:sld xmlns:a="http://schemas.openxmlformats.org/drawingml/2006/main" xmlns:r="http://schemas.openxmlformats.org/officeDocument/2006/relationships" xmlns:p="http://schemas.openxmlformats.org/presentationml/2006/main">
-  <p:cSld>
-    <p:spTree>
-      <p:nvGrpSpPr>
-        <p:cNvPr id="1" name=""/>
-        <p:cNvGrpSpPr/>
-        <p:nvPr/>
-      </p:nvGrpSpPr>
-      <p:grpSpPr>
-        <a:xfrm>
-          <a:off x="0" y="0"/>
-          <a:ext cx="0" cy="0"/>
-          <a:chOff x="0" y="0"/>
-          <a:chExt cx="0" cy="0"/>
-        </a:xfrm>
-      </p:grpSpPr>
-      <p:sp>
-        <p:nvSpPr>
-          <p:cNvPr id="2" name="Title 1">
-            <a:extLst>
-              <a:ext uri="{FF2B5EF4-FFF2-40B4-BE49-F238E27FC236}">
-                <a16:creationId xmlns:a16="http://schemas.microsoft.com/office/drawing/2014/main" id="{0226471A-A7D4-4983-BD2C-AA429652AD19}"/>
-              </a:ext>
-            </a:extLst>
-          </p:cNvPr>
-          <p:cNvSpPr>
-            <a:spLocks noGrp="1"/>
-          </p:cNvSpPr>
-          <p:nvPr>
-            <p:ph type="title"/>
-          </p:nvPr>
-        </p:nvSpPr>
-        <p:spPr/>
-        <p:txBody>
-          <a:bodyPr/>
-          <a:lstStyle/>
-          <a:p>
-            <a:endParaRPr lang="vi-VN"/>
-          </a:p>
-        </p:txBody>
-      </p:sp>
-      <p:sp>
-        <p:nvSpPr>
-          <p:cNvPr id="3" name="Content Placeholder 2">
-            <a:extLst>
-              <a:ext uri="{FF2B5EF4-FFF2-40B4-BE49-F238E27FC236}">
-                <a16:creationId xmlns:a16="http://schemas.microsoft.com/office/drawing/2014/main" id="{F1A19C71-49BB-4341-BB7B-BD3F2AB48C42}"/>
-              </a:ext>
-            </a:extLst>
-          </p:cNvPr>
-          <p:cNvSpPr>
-            <a:spLocks noGrp="1"/>
-          </p:cNvSpPr>
-          <p:nvPr>
-            <p:ph idx="1"/>
-          </p:nvPr>
-        </p:nvSpPr>
-        <p:spPr/>
-        <p:txBody>
-          <a:bodyPr/>
-          <a:lstStyle/>
-          <a:p>
-            <a:endParaRPr lang="vi-VN"/>
-          </a:p>
-        </p:txBody>
-      </p:sp>
-    </p:spTree>
-    <p:extLst>
-      <p:ext uri="{BB962C8B-B14F-4D97-AF65-F5344CB8AC3E}">
-        <p14:creationId xmlns:p14="http://schemas.microsoft.com/office/powerpoint/2010/main" val="682214306"/>
-      </p:ext>
-    </p:extLst>
-  </p:cSld>
-  <p:clrMapOvr>
-    <a:masterClrMapping/>
-  </p:clrMapOvr>
-</p:sld>
-</file>
-
-<file path=ppt/slides/slide26.xml><?xml version="1.0" encoding="utf-8"?>
-<p:sld xmlns:a="http://schemas.openxmlformats.org/drawingml/2006/main" xmlns:r="http://schemas.openxmlformats.org/officeDocument/2006/relationships" xmlns:p="http://schemas.openxmlformats.org/presentationml/2006/main">
-  <p:cSld>
-    <p:spTree>
-      <p:nvGrpSpPr>
-        <p:cNvPr id="1" name=""/>
-        <p:cNvGrpSpPr/>
-        <p:nvPr/>
-      </p:nvGrpSpPr>
-      <p:grpSpPr>
-        <a:xfrm>
-          <a:off x="0" y="0"/>
-          <a:ext cx="0" cy="0"/>
-          <a:chOff x="0" y="0"/>
-          <a:chExt cx="0" cy="0"/>
-        </a:xfrm>
-      </p:grpSpPr>
-      <p:sp>
-        <p:nvSpPr>
-          <p:cNvPr id="2" name="Title 1">
-            <a:extLst>
-              <a:ext uri="{FF2B5EF4-FFF2-40B4-BE49-F238E27FC236}">
-                <a16:creationId xmlns:a16="http://schemas.microsoft.com/office/drawing/2014/main" id="{C1C53A32-4259-45BF-BB50-852EB77C4E65}"/>
-              </a:ext>
-            </a:extLst>
-          </p:cNvPr>
-          <p:cNvSpPr>
-            <a:spLocks noGrp="1"/>
-          </p:cNvSpPr>
-          <p:nvPr>
-            <p:ph type="title"/>
-          </p:nvPr>
-        </p:nvSpPr>
-        <p:spPr/>
-        <p:txBody>
-          <a:bodyPr/>
-          <a:lstStyle/>
-          <a:p>
-            <a:endParaRPr lang="vi-VN"/>
-          </a:p>
-        </p:txBody>
-      </p:sp>
-      <p:sp>
-        <p:nvSpPr>
-          <p:cNvPr id="3" name="Content Placeholder 2">
-            <a:extLst>
-              <a:ext uri="{FF2B5EF4-FFF2-40B4-BE49-F238E27FC236}">
-                <a16:creationId xmlns:a16="http://schemas.microsoft.com/office/drawing/2014/main" id="{BA5328BB-1AE3-48D7-A9C1-0FF582B01453}"/>
-              </a:ext>
-            </a:extLst>
-          </p:cNvPr>
-          <p:cNvSpPr>
-            <a:spLocks noGrp="1"/>
-          </p:cNvSpPr>
-          <p:nvPr>
-            <p:ph idx="1"/>
-          </p:nvPr>
-        </p:nvSpPr>
-        <p:spPr/>
-        <p:txBody>
-          <a:bodyPr/>
-          <a:lstStyle/>
-          <a:p>
-            <a:endParaRPr lang="vi-VN"/>
-          </a:p>
-        </p:txBody>
-      </p:sp>
-    </p:spTree>
-    <p:extLst>
-      <p:ext uri="{BB962C8B-B14F-4D97-AF65-F5344CB8AC3E}">
-        <p14:creationId xmlns:p14="http://schemas.microsoft.com/office/powerpoint/2010/main" val="3233097744"/>
-      </p:ext>
-    </p:extLst>
-  </p:cSld>
-  <p:clrMapOvr>
-    <a:masterClrMapping/>
-  </p:clrMapOvr>
-</p:sld>
-</file>
-
-<file path=ppt/slides/slide27.xml><?xml version="1.0" encoding="utf-8"?>
-<p:sld xmlns:a="http://schemas.openxmlformats.org/drawingml/2006/main" xmlns:r="http://schemas.openxmlformats.org/officeDocument/2006/relationships" xmlns:p="http://schemas.openxmlformats.org/presentationml/2006/main">
-  <p:cSld>
-    <p:spTree>
-      <p:nvGrpSpPr>
-        <p:cNvPr id="1" name=""/>
-        <p:cNvGrpSpPr/>
-        <p:nvPr/>
-      </p:nvGrpSpPr>
-      <p:grpSpPr>
-        <a:xfrm>
-          <a:off x="0" y="0"/>
-          <a:ext cx="0" cy="0"/>
-          <a:chOff x="0" y="0"/>
-          <a:chExt cx="0" cy="0"/>
-        </a:xfrm>
-      </p:grpSpPr>
-      <p:sp>
-        <p:nvSpPr>
-          <p:cNvPr id="2" name="Title 1">
-            <a:extLst>
-              <a:ext uri="{FF2B5EF4-FFF2-40B4-BE49-F238E27FC236}">
-                <a16:creationId xmlns:a16="http://schemas.microsoft.com/office/drawing/2014/main" id="{A66B420F-C11F-42C2-9059-303155C8C831}"/>
-              </a:ext>
-            </a:extLst>
-          </p:cNvPr>
-          <p:cNvSpPr>
-            <a:spLocks noGrp="1"/>
-          </p:cNvSpPr>
-          <p:nvPr>
-            <p:ph type="title"/>
-          </p:nvPr>
-        </p:nvSpPr>
-        <p:spPr/>
-        <p:txBody>
-          <a:bodyPr/>
-          <a:lstStyle/>
-          <a:p>
-            <a:endParaRPr lang="vi-VN"/>
-          </a:p>
-        </p:txBody>
-      </p:sp>
-      <p:sp>
-        <p:nvSpPr>
-          <p:cNvPr id="3" name="Content Placeholder 2">
-            <a:extLst>
-              <a:ext uri="{FF2B5EF4-FFF2-40B4-BE49-F238E27FC236}">
-                <a16:creationId xmlns:a16="http://schemas.microsoft.com/office/drawing/2014/main" id="{00EB9B14-9919-4546-AEC6-818DEC076901}"/>
-              </a:ext>
-            </a:extLst>
-          </p:cNvPr>
-          <p:cNvSpPr>
-            <a:spLocks noGrp="1"/>
-          </p:cNvSpPr>
-          <p:nvPr>
-            <p:ph idx="1"/>
-          </p:nvPr>
-        </p:nvSpPr>
-        <p:spPr/>
-        <p:txBody>
-          <a:bodyPr/>
-          <a:lstStyle/>
-          <a:p>
-            <a:endParaRPr lang="vi-VN"/>
-          </a:p>
-        </p:txBody>
-      </p:sp>
-    </p:spTree>
-    <p:extLst>
-      <p:ext uri="{BB962C8B-B14F-4D97-AF65-F5344CB8AC3E}">
-        <p14:creationId xmlns:p14="http://schemas.microsoft.com/office/powerpoint/2010/main" val="1682047072"/>
-      </p:ext>
-    </p:extLst>
-  </p:cSld>
-  <p:clrMapOvr>
-    <a:masterClrMapping/>
-  </p:clrMapOvr>
-</p:sld>
-</file>
-
-<file path=ppt/slides/slide28.xml><?xml version="1.0" encoding="utf-8"?>
-<p:sld xmlns:a="http://schemas.openxmlformats.org/drawingml/2006/main" xmlns:r="http://schemas.openxmlformats.org/officeDocument/2006/relationships" xmlns:p="http://schemas.openxmlformats.org/presentationml/2006/main">
-  <p:cSld>
-    <p:spTree>
-      <p:nvGrpSpPr>
-        <p:cNvPr id="1" name=""/>
-        <p:cNvGrpSpPr/>
-        <p:nvPr/>
-      </p:nvGrpSpPr>
-      <p:grpSpPr>
-        <a:xfrm>
-          <a:off x="0" y="0"/>
-          <a:ext cx="0" cy="0"/>
-          <a:chOff x="0" y="0"/>
-          <a:chExt cx="0" cy="0"/>
-        </a:xfrm>
-      </p:grpSpPr>
-      <p:sp>
-        <p:nvSpPr>
-          <p:cNvPr id="2" name="Title 1">
-            <a:extLst>
-              <a:ext uri="{FF2B5EF4-FFF2-40B4-BE49-F238E27FC236}">
-                <a16:creationId xmlns:a16="http://schemas.microsoft.com/office/drawing/2014/main" id="{32AFE5C0-E940-4217-8B6C-C29FDCAE2CFE}"/>
-              </a:ext>
-            </a:extLst>
-          </p:cNvPr>
-          <p:cNvSpPr>
-            <a:spLocks noGrp="1"/>
-          </p:cNvSpPr>
-          <p:nvPr>
-            <p:ph type="title"/>
-          </p:nvPr>
-        </p:nvSpPr>
-        <p:spPr/>
-        <p:txBody>
-          <a:bodyPr/>
-          <a:lstStyle/>
-          <a:p>
-            <a:endParaRPr lang="vi-VN"/>
-          </a:p>
-        </p:txBody>
-      </p:sp>
-      <p:sp>
-        <p:nvSpPr>
-          <p:cNvPr id="3" name="Content Placeholder 2">
-            <a:extLst>
-              <a:ext uri="{FF2B5EF4-FFF2-40B4-BE49-F238E27FC236}">
-                <a16:creationId xmlns:a16="http://schemas.microsoft.com/office/drawing/2014/main" id="{ABF8635A-D927-4205-BB60-8567A49A0E45}"/>
-              </a:ext>
-            </a:extLst>
-          </p:cNvPr>
-          <p:cNvSpPr>
-            <a:spLocks noGrp="1"/>
-          </p:cNvSpPr>
-          <p:nvPr>
-            <p:ph idx="1"/>
-          </p:nvPr>
-        </p:nvSpPr>
-        <p:spPr/>
-        <p:txBody>
-          <a:bodyPr/>
-          <a:lstStyle/>
-          <a:p>
-            <a:endParaRPr lang="vi-VN"/>
-          </a:p>
-        </p:txBody>
-      </p:sp>
-    </p:spTree>
-    <p:extLst>
-      <p:ext uri="{BB962C8B-B14F-4D97-AF65-F5344CB8AC3E}">
-        <p14:creationId xmlns:p14="http://schemas.microsoft.com/office/powerpoint/2010/main" val="3831594767"/>
-      </p:ext>
-    </p:extLst>
-  </p:cSld>
-  <p:clrMapOvr>
-    <a:masterClrMapping/>
-  </p:clrMapOvr>
-</p:sld>
-</file>
-
-<file path=ppt/slides/slide29.xml><?xml version="1.0" encoding="utf-8"?>
 <p:sld xmlns:a="http://schemas.openxmlformats.org/drawingml/2006/main" xmlns:r="http://schemas.openxmlformats.org/officeDocument/2006/relationships" xmlns:p="http://schemas.openxmlformats.org/presentationml/2006/main">
   <p:cSld>
     <p:spTree>
@@ -14922,6 +11609,112 @@
     <p:extLst>
       <p:ext uri="{BB962C8B-B14F-4D97-AF65-F5344CB8AC3E}">
         <p14:creationId xmlns:p14="http://schemas.microsoft.com/office/powerpoint/2010/main" val="2212963514"/>
+      </p:ext>
+    </p:extLst>
+  </p:cSld>
+  <p:clrMapOvr>
+    <a:masterClrMapping/>
+  </p:clrMapOvr>
+</p:sld>
+</file>
+
+<file path=ppt/slides/slide2.xml><?xml version="1.0" encoding="utf-8"?>
+<p:sld xmlns:a="http://schemas.openxmlformats.org/drawingml/2006/main" xmlns:r="http://schemas.openxmlformats.org/officeDocument/2006/relationships" xmlns:p="http://schemas.openxmlformats.org/presentationml/2006/main">
+  <p:cSld>
+    <p:spTree>
+      <p:nvGrpSpPr>
+        <p:cNvPr id="1" name=""/>
+        <p:cNvGrpSpPr/>
+        <p:nvPr/>
+      </p:nvGrpSpPr>
+      <p:grpSpPr>
+        <a:xfrm>
+          <a:off x="0" y="0"/>
+          <a:ext cx="0" cy="0"/>
+          <a:chOff x="0" y="0"/>
+          <a:chExt cx="0" cy="0"/>
+        </a:xfrm>
+      </p:grpSpPr>
+      <p:sp>
+        <p:nvSpPr>
+          <p:cNvPr id="2" name="Title 1">
+            <a:extLst>
+              <a:ext uri="{FF2B5EF4-FFF2-40B4-BE49-F238E27FC236}">
+                <a16:creationId xmlns:a16="http://schemas.microsoft.com/office/drawing/2014/main" id="{B0A6BCEB-2D1F-41E9-AB57-DB322861DFAB}"/>
+              </a:ext>
+            </a:extLst>
+          </p:cNvPr>
+          <p:cNvSpPr>
+            <a:spLocks noGrp="1"/>
+          </p:cNvSpPr>
+          <p:nvPr>
+            <p:ph type="title"/>
+          </p:nvPr>
+        </p:nvSpPr>
+        <p:spPr>
+          <a:xfrm>
+            <a:off x="1295400" y="450669"/>
+            <a:ext cx="9601200" cy="816429"/>
+          </a:xfrm>
+        </p:spPr>
+        <p:txBody>
+          <a:bodyPr/>
+          <a:lstStyle/>
+          <a:p>
+            <a:r>
+              <a:rPr lang="en-US" b="1" dirty="0">
+                <a:solidFill>
+                  <a:srgbClr val="FF0000"/>
+                </a:solidFill>
+                <a:latin typeface="Tahoma" panose="020B0604030504040204" pitchFamily="34" charset="0"/>
+                <a:ea typeface="Tahoma" panose="020B0604030504040204" pitchFamily="34" charset="0"/>
+                <a:cs typeface="Tahoma" panose="020B0604030504040204" pitchFamily="34" charset="0"/>
+              </a:rPr>
+              <a:t>Structure:</a:t>
+            </a:r>
+            <a:endParaRPr lang="vi-VN" b="1" dirty="0">
+              <a:solidFill>
+                <a:srgbClr val="FF0000"/>
+              </a:solidFill>
+              <a:latin typeface="Tahoma" panose="020B0604030504040204" pitchFamily="34" charset="0"/>
+              <a:ea typeface="Tahoma" panose="020B0604030504040204" pitchFamily="34" charset="0"/>
+              <a:cs typeface="Tahoma" panose="020B0604030504040204" pitchFamily="34" charset="0"/>
+            </a:endParaRPr>
+          </a:p>
+        </p:txBody>
+      </p:sp>
+      <p:graphicFrame>
+        <p:nvGraphicFramePr>
+          <p:cNvPr id="4" name="Diagram 3">
+            <a:extLst>
+              <a:ext uri="{FF2B5EF4-FFF2-40B4-BE49-F238E27FC236}">
+                <a16:creationId xmlns:a16="http://schemas.microsoft.com/office/drawing/2014/main" id="{67797590-7AEA-4B1B-BA98-2F0D2203915E}"/>
+              </a:ext>
+            </a:extLst>
+          </p:cNvPr>
+          <p:cNvGraphicFramePr/>
+          <p:nvPr>
+            <p:extLst>
+              <p:ext uri="{D42A27DB-BD31-4B8C-83A1-F6EECF244321}">
+                <p14:modId xmlns:p14="http://schemas.microsoft.com/office/powerpoint/2010/main" val="2180006905"/>
+              </p:ext>
+            </p:extLst>
+          </p:nvPr>
+        </p:nvGraphicFramePr>
+        <p:xfrm>
+          <a:off x="2645954" y="1267098"/>
+          <a:ext cx="7765143" cy="4701419"/>
+        </p:xfrm>
+        <a:graphic>
+          <a:graphicData uri="http://schemas.openxmlformats.org/drawingml/2006/diagram">
+            <dgm:relIds xmlns:dgm="http://schemas.openxmlformats.org/drawingml/2006/diagram" xmlns:r="http://schemas.openxmlformats.org/officeDocument/2006/relationships" r:dm="rId2" r:lo="rId3" r:qs="rId4" r:cs="rId5"/>
+          </a:graphicData>
+        </a:graphic>
+      </p:graphicFrame>
+    </p:spTree>
+    <p:extLst>
+      <p:ext uri="{BB962C8B-B14F-4D97-AF65-F5344CB8AC3E}">
+        <p14:creationId xmlns:p14="http://schemas.microsoft.com/office/powerpoint/2010/main" val="1491828072"/>
       </p:ext>
     </p:extLst>
   </p:cSld>
@@ -16421,12 +13214,158 @@
           <a:chExt cx="0" cy="0"/>
         </a:xfrm>
       </p:grpSpPr>
+      <p:sp>
+        <p:nvSpPr>
+          <p:cNvPr id="7" name="Rectangle 6">
+            <a:extLst>
+              <a:ext uri="{FF2B5EF4-FFF2-40B4-BE49-F238E27FC236}">
+                <a16:creationId xmlns:a16="http://schemas.microsoft.com/office/drawing/2014/main" id="{7AAE6DAD-873F-4A7A-8D39-920FCA61C70D}"/>
+              </a:ext>
+            </a:extLst>
+          </p:cNvPr>
+          <p:cNvSpPr/>
+          <p:nvPr/>
+        </p:nvSpPr>
+        <p:spPr>
+          <a:xfrm>
+            <a:off x="1509330" y="1276181"/>
+            <a:ext cx="9907607" cy="5509200"/>
+          </a:xfrm>
+          <a:prstGeom prst="rect">
+            <a:avLst/>
+          </a:prstGeom>
+        </p:spPr>
+        <p:txBody>
+          <a:bodyPr wrap="square">
+            <a:spAutoFit/>
+          </a:bodyPr>
+          <a:lstStyle/>
+          <a:p>
+            <a:r>
+              <a:rPr lang="vi-VN" sz="3200" b="1" dirty="0">
+                <a:solidFill>
+                  <a:srgbClr val="21313A"/>
+                </a:solidFill>
+                <a:latin typeface="Work Sans"/>
+              </a:rPr>
+              <a:t>1. Create a customer</a:t>
+            </a:r>
+          </a:p>
+          <a:p>
+            <a:r>
+              <a:rPr lang="vi-VN" sz="3200" b="1" dirty="0">
+                <a:solidFill>
+                  <a:srgbClr val="21313A"/>
+                </a:solidFill>
+                <a:latin typeface="Work Sans"/>
+              </a:rPr>
+              <a:t>2. Activate invoicing</a:t>
+            </a:r>
+          </a:p>
+          <a:p>
+            <a:r>
+              <a:rPr lang="en-US" sz="3200" b="1" dirty="0">
+                <a:solidFill>
+                  <a:srgbClr val="21313A"/>
+                </a:solidFill>
+                <a:latin typeface="Work Sans"/>
+              </a:rPr>
+              <a:t>3. Accept returns and refund products</a:t>
+            </a:r>
+          </a:p>
+          <a:p>
+            <a:r>
+              <a:rPr lang="en-US" sz="3200" b="1" dirty="0">
+                <a:solidFill>
+                  <a:srgbClr val="21313A"/>
+                </a:solidFill>
+                <a:latin typeface="Work Sans"/>
+              </a:rPr>
+              <a:t>4. Apply time-limited discounts</a:t>
+            </a:r>
+          </a:p>
+          <a:p>
+            <a:r>
+              <a:rPr lang="en-US" sz="3200" b="1" dirty="0">
+                <a:solidFill>
+                  <a:srgbClr val="21313A"/>
+                </a:solidFill>
+                <a:latin typeface="Work Sans"/>
+              </a:rPr>
+              <a:t>5. Set-up Cash Control in Point of Sale</a:t>
+            </a:r>
+          </a:p>
+          <a:p>
+            <a:r>
+              <a:rPr lang="en-US" sz="3200" b="1" dirty="0">
+                <a:solidFill>
+                  <a:srgbClr val="21313A"/>
+                </a:solidFill>
+                <a:latin typeface="Work Sans"/>
+              </a:rPr>
+              <a:t>6. Setup POS Restaurant/Bar</a:t>
+            </a:r>
+          </a:p>
+          <a:p>
+            <a:r>
+              <a:rPr lang="en-US" sz="3200" b="1" dirty="0">
+                <a:solidFill>
+                  <a:srgbClr val="21313A"/>
+                </a:solidFill>
+                <a:latin typeface="Work Sans"/>
+              </a:rPr>
+              <a:t>7. Configure your table management</a:t>
+            </a:r>
+          </a:p>
+          <a:p>
+            <a:r>
+              <a:rPr lang="en-US" sz="3200" b="1" dirty="0">
+                <a:solidFill>
+                  <a:srgbClr val="21313A"/>
+                </a:solidFill>
+                <a:latin typeface="Work Sans"/>
+              </a:rPr>
+              <a:t>8. Offer a bill-splitting option</a:t>
+            </a:r>
+          </a:p>
+          <a:p>
+            <a:r>
+              <a:rPr lang="en-US" sz="3200" b="1" dirty="0">
+                <a:solidFill>
+                  <a:srgbClr val="21313A"/>
+                </a:solidFill>
+                <a:latin typeface="Work Sans"/>
+              </a:rPr>
+              <a:t>9. Print the Bill</a:t>
+            </a:r>
+          </a:p>
+          <a:p>
+            <a:r>
+              <a:rPr lang="en-US" sz="3200" b="1" dirty="0">
+                <a:solidFill>
+                  <a:srgbClr val="21313A"/>
+                </a:solidFill>
+                <a:latin typeface="Work Sans"/>
+              </a:rPr>
+              <a:t>10. Print orders at the kitchen or bar</a:t>
+            </a:r>
+          </a:p>
+          <a:p>
+            <a:endParaRPr lang="en-US" sz="3200" b="1" dirty="0">
+              <a:solidFill>
+                <a:srgbClr val="21313A"/>
+              </a:solidFill>
+              <a:latin typeface="Work Sans"/>
+            </a:endParaRPr>
+          </a:p>
+        </p:txBody>
+      </p:sp>
       <p:grpSp>
         <p:nvGrpSpPr>
-          <p:cNvPr id="4" name="Group 3">
+          <p:cNvPr id="8" name="Group 7">
             <a:extLst>
               <a:ext uri="{FF2B5EF4-FFF2-40B4-BE49-F238E27FC236}">
-                <a16:creationId xmlns:a16="http://schemas.microsoft.com/office/drawing/2014/main" id="{D944BAA1-C6F8-40D8-9555-818F8267CF7F}"/>
+                <a16:creationId xmlns:a16="http://schemas.microsoft.com/office/drawing/2014/main" id="{C6A0CE12-921F-4457-B731-B172D1E7D3D5}"/>
               </a:ext>
             </a:extLst>
           </p:cNvPr>
@@ -16435,18 +13374,18 @@
         </p:nvGrpSpPr>
         <p:grpSpPr>
           <a:xfrm>
-            <a:off x="946331" y="151708"/>
-            <a:ext cx="7765143" cy="911430"/>
+            <a:off x="946332" y="151708"/>
+            <a:ext cx="5258526" cy="911430"/>
             <a:chOff x="0" y="2405429"/>
             <a:chExt cx="7765143" cy="911430"/>
           </a:xfrm>
         </p:grpSpPr>
         <p:sp>
           <p:nvSpPr>
-            <p:cNvPr id="5" name="Rectangle: Rounded Corners 4">
+            <p:cNvPr id="9" name="Rectangle: Rounded Corners 8">
               <a:extLst>
                 <a:ext uri="{FF2B5EF4-FFF2-40B4-BE49-F238E27FC236}">
-                  <a16:creationId xmlns:a16="http://schemas.microsoft.com/office/drawing/2014/main" id="{61EEB3F5-CF75-42ED-9C45-79AB7C3777BB}"/>
+                  <a16:creationId xmlns:a16="http://schemas.microsoft.com/office/drawing/2014/main" id="{52A8DB6B-2AFB-4ED3-912C-ADD4732F2446}"/>
                 </a:ext>
               </a:extLst>
             </p:cNvPr>
@@ -16494,10 +13433,10 @@
         </p:sp>
         <p:sp>
           <p:nvSpPr>
-            <p:cNvPr id="6" name="Rectangle: Rounded Corners 4">
+            <p:cNvPr id="10" name="Rectangle: Rounded Corners 4">
               <a:extLst>
                 <a:ext uri="{FF2B5EF4-FFF2-40B4-BE49-F238E27FC236}">
-                  <a16:creationId xmlns:a16="http://schemas.microsoft.com/office/drawing/2014/main" id="{A6AE1549-2AE4-40DE-AF1C-EF8CD8CD4C27}"/>
+                  <a16:creationId xmlns:a16="http://schemas.microsoft.com/office/drawing/2014/main" id="{DC22A844-1AFB-4092-ADA8-2394731CC7FB}"/>
                 </a:ext>
               </a:extLst>
             </p:cNvPr>
@@ -16562,130 +13501,10 @@
           </p:txBody>
         </p:sp>
       </p:grpSp>
-      <p:sp>
-        <p:nvSpPr>
-          <p:cNvPr id="7" name="Rectangle 6">
-            <a:extLst>
-              <a:ext uri="{FF2B5EF4-FFF2-40B4-BE49-F238E27FC236}">
-                <a16:creationId xmlns:a16="http://schemas.microsoft.com/office/drawing/2014/main" id="{7AAE6DAD-873F-4A7A-8D39-920FCA61C70D}"/>
-              </a:ext>
-            </a:extLst>
-          </p:cNvPr>
-          <p:cNvSpPr/>
-          <p:nvPr/>
-        </p:nvSpPr>
-        <p:spPr>
-          <a:xfrm>
-            <a:off x="1535456" y="1119427"/>
-            <a:ext cx="4560544" cy="707886"/>
-          </a:xfrm>
-          <a:prstGeom prst="rect">
-            <a:avLst/>
-          </a:prstGeom>
-        </p:spPr>
-        <p:txBody>
-          <a:bodyPr wrap="none">
-            <a:spAutoFit/>
-          </a:bodyPr>
-          <a:lstStyle/>
-          <a:p>
-            <a:r>
-              <a:rPr lang="vi-VN" sz="4000" b="1" dirty="0">
-                <a:solidFill>
-                  <a:srgbClr val="21313A"/>
-                </a:solidFill>
-                <a:latin typeface="Work Sans"/>
-              </a:rPr>
-              <a:t>1. Create a customer</a:t>
-            </a:r>
-            <a:endParaRPr lang="vi-VN" sz="4000" b="1" i="0" dirty="0">
-              <a:solidFill>
-                <a:srgbClr val="21313A"/>
-              </a:solidFill>
-              <a:effectLst/>
-              <a:latin typeface="Work Sans"/>
-            </a:endParaRPr>
-          </a:p>
-        </p:txBody>
-      </p:sp>
-      <p:sp>
-        <p:nvSpPr>
-          <p:cNvPr id="8" name="Rectangle 7">
-            <a:extLst>
-              <a:ext uri="{FF2B5EF4-FFF2-40B4-BE49-F238E27FC236}">
-                <a16:creationId xmlns:a16="http://schemas.microsoft.com/office/drawing/2014/main" id="{BD8B5AAD-BF7A-44F2-ABA1-1CA1ECEE9DB4}"/>
-              </a:ext>
-            </a:extLst>
-          </p:cNvPr>
-          <p:cNvSpPr/>
-          <p:nvPr/>
-        </p:nvSpPr>
-        <p:spPr>
-          <a:xfrm>
-            <a:off x="1924593" y="1827313"/>
-            <a:ext cx="9714411" cy="954107"/>
-          </a:xfrm>
-          <a:prstGeom prst="rect">
-            <a:avLst/>
-          </a:prstGeom>
-        </p:spPr>
-        <p:txBody>
-          <a:bodyPr wrap="square">
-            <a:spAutoFit/>
-          </a:bodyPr>
-          <a:lstStyle/>
-          <a:p>
-            <a:r>
-              <a:rPr lang="en-US" sz="2800" dirty="0">
-                <a:latin typeface="-apple-system"/>
-              </a:rPr>
-              <a:t>Registering your customers will give you the ability to grant them various privileges such as discounts, loyalty program ...</a:t>
-            </a:r>
-            <a:endParaRPr lang="vi-VN" sz="2800" dirty="0"/>
-          </a:p>
-        </p:txBody>
-      </p:sp>
-      <p:sp>
-        <p:nvSpPr>
-          <p:cNvPr id="9" name="Rectangle 8">
-            <a:extLst>
-              <a:ext uri="{FF2B5EF4-FFF2-40B4-BE49-F238E27FC236}">
-                <a16:creationId xmlns:a16="http://schemas.microsoft.com/office/drawing/2014/main" id="{CAFBA94F-FBB8-46A6-8AD6-8CB55E1C6304}"/>
-              </a:ext>
-            </a:extLst>
-          </p:cNvPr>
-          <p:cNvSpPr/>
-          <p:nvPr/>
-        </p:nvSpPr>
-        <p:spPr>
-          <a:xfrm>
-            <a:off x="1924593" y="2982667"/>
-            <a:ext cx="9374777" cy="954107"/>
-          </a:xfrm>
-          <a:prstGeom prst="rect">
-            <a:avLst/>
-          </a:prstGeom>
-        </p:spPr>
-        <p:txBody>
-          <a:bodyPr wrap="square">
-            <a:spAutoFit/>
-          </a:bodyPr>
-          <a:lstStyle/>
-          <a:p>
-            <a:r>
-              <a:rPr lang="en-US" sz="2800" dirty="0">
-                <a:latin typeface="-apple-system"/>
-              </a:rPr>
-              <a:t>It will also be required if they want an invoice and registering them will make any future interaction with them faster.</a:t>
-            </a:r>
-            <a:endParaRPr lang="vi-VN" sz="2800" dirty="0"/>
-          </a:p>
-        </p:txBody>
-      </p:sp>
     </p:spTree>
     <p:extLst>
       <p:ext uri="{BB962C8B-B14F-4D97-AF65-F5344CB8AC3E}">
-        <p14:creationId xmlns:p14="http://schemas.microsoft.com/office/powerpoint/2010/main" val="967820989"/>
+        <p14:creationId xmlns:p14="http://schemas.microsoft.com/office/powerpoint/2010/main" val="3591653558"/>
       </p:ext>
     </p:extLst>
   </p:cSld>
@@ -16712,12 +13531,150 @@
           <a:chExt cx="0" cy="0"/>
         </a:xfrm>
       </p:grpSpPr>
+      <p:sp>
+        <p:nvSpPr>
+          <p:cNvPr id="7" name="Rectangle 6">
+            <a:extLst>
+              <a:ext uri="{FF2B5EF4-FFF2-40B4-BE49-F238E27FC236}">
+                <a16:creationId xmlns:a16="http://schemas.microsoft.com/office/drawing/2014/main" id="{7AAE6DAD-873F-4A7A-8D39-920FCA61C70D}"/>
+              </a:ext>
+            </a:extLst>
+          </p:cNvPr>
+          <p:cNvSpPr/>
+          <p:nvPr/>
+        </p:nvSpPr>
+        <p:spPr>
+          <a:xfrm>
+            <a:off x="1535455" y="1341495"/>
+            <a:ext cx="9907607" cy="5016758"/>
+          </a:xfrm>
+          <a:prstGeom prst="rect">
+            <a:avLst/>
+          </a:prstGeom>
+        </p:spPr>
+        <p:txBody>
+          <a:bodyPr wrap="square">
+            <a:spAutoFit/>
+          </a:bodyPr>
+          <a:lstStyle/>
+          <a:p>
+            <a:r>
+              <a:rPr lang="en-US" sz="3200" b="1" dirty="0">
+                <a:solidFill>
+                  <a:srgbClr val="21313A"/>
+                </a:solidFill>
+                <a:latin typeface="Work Sans"/>
+              </a:rPr>
+              <a:t>11. Integrate a tip option into payment</a:t>
+            </a:r>
+          </a:p>
+          <a:p>
+            <a:r>
+              <a:rPr lang="en-US" sz="3200" b="1" dirty="0">
+                <a:solidFill>
+                  <a:srgbClr val="21313A"/>
+                </a:solidFill>
+                <a:latin typeface="Work Sans"/>
+              </a:rPr>
+              <a:t>12. Transfer customers between tables</a:t>
+            </a:r>
+          </a:p>
+          <a:p>
+            <a:r>
+              <a:rPr lang="en-US" sz="3200" b="1" dirty="0">
+                <a:solidFill>
+                  <a:srgbClr val="21313A"/>
+                </a:solidFill>
+                <a:latin typeface="Work Sans"/>
+              </a:rPr>
+              <a:t>13. Register multiple orders</a:t>
+            </a:r>
+          </a:p>
+          <a:p>
+            <a:r>
+              <a:rPr lang="en-US" sz="3200" b="1" dirty="0">
+                <a:solidFill>
+                  <a:srgbClr val="21313A"/>
+                </a:solidFill>
+                <a:latin typeface="Work Sans"/>
+              </a:rPr>
+              <a:t>13. Using barcodes in POS</a:t>
+            </a:r>
+          </a:p>
+          <a:p>
+            <a:r>
+              <a:rPr lang="en-US" sz="3200" b="1" dirty="0">
+                <a:solidFill>
+                  <a:srgbClr val="21313A"/>
+                </a:solidFill>
+                <a:latin typeface="Work Sans"/>
+              </a:rPr>
+              <a:t>15. Using discount tags with a barcode scanner</a:t>
+            </a:r>
+          </a:p>
+          <a:p>
+            <a:r>
+              <a:rPr lang="en-US" sz="3200" b="1" dirty="0">
+                <a:solidFill>
+                  <a:srgbClr val="21313A"/>
+                </a:solidFill>
+                <a:latin typeface="Work Sans"/>
+              </a:rPr>
+              <a:t>16. Manage multiple cashiers</a:t>
+            </a:r>
+          </a:p>
+          <a:p>
+            <a:r>
+              <a:rPr lang="en-US" sz="3200" b="1" dirty="0">
+                <a:solidFill>
+                  <a:srgbClr val="21313A"/>
+                </a:solidFill>
+                <a:latin typeface="Work Sans"/>
+              </a:rPr>
+              <a:t>17. Manage a loyalty program</a:t>
+            </a:r>
+          </a:p>
+          <a:p>
+            <a:r>
+              <a:rPr lang="en-US" sz="3200" b="1" dirty="0">
+                <a:solidFill>
+                  <a:srgbClr val="21313A"/>
+                </a:solidFill>
+                <a:latin typeface="Work Sans"/>
+              </a:rPr>
+              <a:t>18. Apply manual discounts</a:t>
+            </a:r>
+          </a:p>
+          <a:p>
+            <a:r>
+              <a:rPr lang="en-US" sz="3200" b="1" dirty="0">
+                <a:solidFill>
+                  <a:srgbClr val="21313A"/>
+                </a:solidFill>
+                <a:latin typeface="Work Sans"/>
+              </a:rPr>
+              <a:t>19. Reprint Receipts</a:t>
+            </a:r>
+          </a:p>
+          <a:p>
+            <a:r>
+              <a:rPr lang="en-US" sz="3200" b="1" dirty="0">
+                <a:solidFill>
+                  <a:srgbClr val="21313A"/>
+                </a:solidFill>
+                <a:latin typeface="Work Sans"/>
+              </a:rPr>
+              <a:t>20. Accept credit card payment using Mercury</a:t>
+            </a:r>
+          </a:p>
+        </p:txBody>
+      </p:sp>
       <p:grpSp>
         <p:nvGrpSpPr>
-          <p:cNvPr id="4" name="Group 3">
+          <p:cNvPr id="11" name="Group 10">
             <a:extLst>
               <a:ext uri="{FF2B5EF4-FFF2-40B4-BE49-F238E27FC236}">
-                <a16:creationId xmlns:a16="http://schemas.microsoft.com/office/drawing/2014/main" id="{D944BAA1-C6F8-40D8-9555-818F8267CF7F}"/>
+                <a16:creationId xmlns:a16="http://schemas.microsoft.com/office/drawing/2014/main" id="{E5CAEC49-7A76-48AF-8E89-EA087B13D8B7}"/>
               </a:ext>
             </a:extLst>
           </p:cNvPr>
@@ -16726,18 +13683,18 @@
         </p:nvGrpSpPr>
         <p:grpSpPr>
           <a:xfrm>
-            <a:off x="946331" y="151708"/>
-            <a:ext cx="7765143" cy="911430"/>
+            <a:off x="946332" y="151708"/>
+            <a:ext cx="5258526" cy="911430"/>
             <a:chOff x="0" y="2405429"/>
             <a:chExt cx="7765143" cy="911430"/>
           </a:xfrm>
         </p:grpSpPr>
         <p:sp>
           <p:nvSpPr>
-            <p:cNvPr id="5" name="Rectangle: Rounded Corners 4">
+            <p:cNvPr id="12" name="Rectangle: Rounded Corners 11">
               <a:extLst>
                 <a:ext uri="{FF2B5EF4-FFF2-40B4-BE49-F238E27FC236}">
-                  <a16:creationId xmlns:a16="http://schemas.microsoft.com/office/drawing/2014/main" id="{61EEB3F5-CF75-42ED-9C45-79AB7C3777BB}"/>
+                  <a16:creationId xmlns:a16="http://schemas.microsoft.com/office/drawing/2014/main" id="{68BB3412-F860-4FD8-B4D6-E27C822337EB}"/>
                 </a:ext>
               </a:extLst>
             </p:cNvPr>
@@ -16785,10 +13742,10 @@
         </p:sp>
         <p:sp>
           <p:nvSpPr>
-            <p:cNvPr id="6" name="Rectangle: Rounded Corners 4">
+            <p:cNvPr id="13" name="Rectangle: Rounded Corners 4">
               <a:extLst>
                 <a:ext uri="{FF2B5EF4-FFF2-40B4-BE49-F238E27FC236}">
-                  <a16:creationId xmlns:a16="http://schemas.microsoft.com/office/drawing/2014/main" id="{A6AE1549-2AE4-40DE-AF1C-EF8CD8CD4C27}"/>
+                  <a16:creationId xmlns:a16="http://schemas.microsoft.com/office/drawing/2014/main" id="{A0053F9D-E20D-4DA8-8754-2073CD3F1D50}"/>
                 </a:ext>
               </a:extLst>
             </p:cNvPr>
@@ -16853,103 +13810,10 @@
           </p:txBody>
         </p:sp>
       </p:grpSp>
-      <p:sp>
-        <p:nvSpPr>
-          <p:cNvPr id="10" name="Rectangle 9">
-            <a:extLst>
-              <a:ext uri="{FF2B5EF4-FFF2-40B4-BE49-F238E27FC236}">
-                <a16:creationId xmlns:a16="http://schemas.microsoft.com/office/drawing/2014/main" id="{DA13A663-A660-4142-A601-35F4AB3CB6CB}"/>
-              </a:ext>
-            </a:extLst>
-          </p:cNvPr>
-          <p:cNvSpPr/>
-          <p:nvPr/>
-        </p:nvSpPr>
-        <p:spPr>
-          <a:xfrm>
-            <a:off x="1535456" y="1119427"/>
-            <a:ext cx="4560544" cy="707886"/>
-          </a:xfrm>
-          <a:prstGeom prst="rect">
-            <a:avLst/>
-          </a:prstGeom>
-        </p:spPr>
-        <p:txBody>
-          <a:bodyPr wrap="none">
-            <a:spAutoFit/>
-          </a:bodyPr>
-          <a:lstStyle/>
-          <a:p>
-            <a:r>
-              <a:rPr lang="vi-VN" sz="4000" b="1" dirty="0">
-                <a:solidFill>
-                  <a:srgbClr val="21313A"/>
-                </a:solidFill>
-                <a:latin typeface="Work Sans"/>
-              </a:rPr>
-              <a:t>1. Create a customer</a:t>
-            </a:r>
-            <a:endParaRPr lang="vi-VN" sz="4000" b="1" i="0" dirty="0">
-              <a:solidFill>
-                <a:srgbClr val="21313A"/>
-              </a:solidFill>
-              <a:effectLst/>
-              <a:latin typeface="Work Sans"/>
-            </a:endParaRPr>
-          </a:p>
-        </p:txBody>
-      </p:sp>
-      <p:pic>
-        <p:nvPicPr>
-          <p:cNvPr id="3074" name="Picture 2">
-            <a:extLst>
-              <a:ext uri="{FF2B5EF4-FFF2-40B4-BE49-F238E27FC236}">
-                <a16:creationId xmlns:a16="http://schemas.microsoft.com/office/drawing/2014/main" id="{CFD154C1-DE17-4F49-AE35-94407BB1C467}"/>
-              </a:ext>
-            </a:extLst>
-          </p:cNvPr>
-          <p:cNvPicPr>
-            <a:picLocks noChangeAspect="1" noChangeArrowheads="1"/>
-          </p:cNvPicPr>
-          <p:nvPr/>
-        </p:nvPicPr>
-        <p:blipFill>
-          <a:blip r:embed="rId2">
-            <a:extLst>
-              <a:ext uri="{28A0092B-C50C-407E-A947-70E740481C1C}">
-                <a14:useLocalDpi xmlns:a14="http://schemas.microsoft.com/office/drawing/2010/main" val="0"/>
-              </a:ext>
-            </a:extLst>
-          </a:blip>
-          <a:srcRect/>
-          <a:stretch>
-            <a:fillRect/>
-          </a:stretch>
-        </p:blipFill>
-        <p:spPr bwMode="auto">
-          <a:xfrm>
-            <a:off x="2806559" y="2068967"/>
-            <a:ext cx="7486971" cy="4088346"/>
-          </a:xfrm>
-          <a:prstGeom prst="rect">
-            <a:avLst/>
-          </a:prstGeom>
-          <a:noFill/>
-          <a:extLst>
-            <a:ext uri="{909E8E84-426E-40DD-AFC4-6F175D3DCCD1}">
-              <a14:hiddenFill xmlns:a14="http://schemas.microsoft.com/office/drawing/2010/main">
-                <a:solidFill>
-                  <a:srgbClr val="FFFFFF"/>
-                </a:solidFill>
-              </a14:hiddenFill>
-            </a:ext>
-          </a:extLst>
-        </p:spPr>
-      </p:pic>
     </p:spTree>
     <p:extLst>
       <p:ext uri="{BB962C8B-B14F-4D97-AF65-F5344CB8AC3E}">
-        <p14:creationId xmlns:p14="http://schemas.microsoft.com/office/powerpoint/2010/main" val="1300754555"/>
+        <p14:creationId xmlns:p14="http://schemas.microsoft.com/office/powerpoint/2010/main" val="634675115"/>
       </p:ext>
     </p:extLst>
   </p:cSld>

</xml_diff>